<commit_message>
Add slides about experiment
</commit_message>
<xml_diff>
--- a/papers/소종 계획표 - 복사본.pptx
+++ b/papers/소종 계획표 - 복사본.pptx
@@ -5,17 +5,19 @@
     <p:sldMasterId id="2147483648" r:id="rId1"/>
   </p:sldMasterIdLst>
   <p:notesMasterIdLst>
-    <p:notesMasterId r:id="rId7"/>
+    <p:notesMasterId r:id="rId9"/>
   </p:notesMasterIdLst>
   <p:handoutMasterIdLst>
-    <p:handoutMasterId r:id="rId8"/>
+    <p:handoutMasterId r:id="rId10"/>
   </p:handoutMasterIdLst>
   <p:sldIdLst>
     <p:sldId id="603" r:id="rId2"/>
     <p:sldId id="604" r:id="rId3"/>
-    <p:sldId id="607" r:id="rId4"/>
-    <p:sldId id="605" r:id="rId5"/>
-    <p:sldId id="606" r:id="rId6"/>
+    <p:sldId id="608" r:id="rId4"/>
+    <p:sldId id="610" r:id="rId5"/>
+    <p:sldId id="611" r:id="rId6"/>
+    <p:sldId id="605" r:id="rId7"/>
+    <p:sldId id="606" r:id="rId8"/>
   </p:sldIdLst>
   <p:sldSz cx="9144000" cy="6858000" type="screen4x3"/>
   <p:notesSz cx="6742113" cy="9872663"/>
@@ -1146,7 +1148,7 @@
     </p:spTree>
     <p:extLst>
       <p:ext uri="{BB962C8B-B14F-4D97-AF65-F5344CB8AC3E}">
-        <p14:creationId xmlns:p14="http://schemas.microsoft.com/office/powerpoint/2010/main" val="97066023"/>
+        <p14:creationId xmlns:p14="http://schemas.microsoft.com/office/powerpoint/2010/main" val="1534966022"/>
       </p:ext>
     </p:extLst>
   </p:cSld>
@@ -1228,6 +1230,186 @@
                 <a:defRPr/>
               </a:pPr>
               <a:t>3</a:t>
+            </a:fld>
+            <a:endParaRPr lang="en-US" altLang="ko-KR" dirty="0"/>
+          </a:p>
+        </p:txBody>
+      </p:sp>
+    </p:spTree>
+    <p:extLst>
+      <p:ext uri="{BB962C8B-B14F-4D97-AF65-F5344CB8AC3E}">
+        <p14:creationId xmlns:p14="http://schemas.microsoft.com/office/powerpoint/2010/main" val="346325036"/>
+      </p:ext>
+    </p:extLst>
+  </p:cSld>
+  <p:clrMapOvr>
+    <a:masterClrMapping/>
+  </p:clrMapOvr>
+</p:notes>
+</file>
+
+<file path=ppt/notesSlides/notesSlide5.xml><?xml version="1.0" encoding="utf-8"?>
+<p:notes xmlns:a="http://schemas.openxmlformats.org/drawingml/2006/main" xmlns:r="http://schemas.openxmlformats.org/officeDocument/2006/relationships" xmlns:p="http://schemas.openxmlformats.org/presentationml/2006/main">
+  <p:cSld>
+    <p:spTree>
+      <p:nvGrpSpPr>
+        <p:cNvPr id="1" name=""/>
+        <p:cNvGrpSpPr/>
+        <p:nvPr/>
+      </p:nvGrpSpPr>
+      <p:grpSpPr>
+        <a:xfrm>
+          <a:off x="0" y="0"/>
+          <a:ext cx="0" cy="0"/>
+          <a:chOff x="0" y="0"/>
+          <a:chExt cx="0" cy="0"/>
+        </a:xfrm>
+      </p:grpSpPr>
+      <p:sp>
+        <p:nvSpPr>
+          <p:cNvPr id="2" name="슬라이드 이미지 개체 틀 1"/>
+          <p:cNvSpPr>
+            <a:spLocks noGrp="1" noRot="1" noChangeAspect="1"/>
+          </p:cNvSpPr>
+          <p:nvPr>
+            <p:ph type="sldImg"/>
+          </p:nvPr>
+        </p:nvSpPr>
+        <p:spPr/>
+      </p:sp>
+      <p:sp>
+        <p:nvSpPr>
+          <p:cNvPr id="3" name="슬라이드 노트 개체 틀 2"/>
+          <p:cNvSpPr>
+            <a:spLocks noGrp="1"/>
+          </p:cNvSpPr>
+          <p:nvPr>
+            <p:ph type="body" idx="1"/>
+          </p:nvPr>
+        </p:nvSpPr>
+        <p:spPr/>
+        <p:txBody>
+          <a:bodyPr/>
+          <a:lstStyle/>
+          <a:p>
+            <a:endParaRPr lang="en-US" altLang="ko-KR" dirty="0"/>
+          </a:p>
+        </p:txBody>
+      </p:sp>
+      <p:sp>
+        <p:nvSpPr>
+          <p:cNvPr id="4" name="슬라이드 번호 개체 틀 3"/>
+          <p:cNvSpPr>
+            <a:spLocks noGrp="1"/>
+          </p:cNvSpPr>
+          <p:nvPr>
+            <p:ph type="sldNum" sz="quarter" idx="10"/>
+          </p:nvPr>
+        </p:nvSpPr>
+        <p:spPr/>
+        <p:txBody>
+          <a:bodyPr/>
+          <a:lstStyle/>
+          <a:p>
+            <a:pPr>
+              <a:defRPr/>
+            </a:pPr>
+            <a:fld id="{107C636C-D4EC-469F-9D4E-6014B0837E4A}" type="slidenum">
+              <a:rPr lang="en-US" altLang="ko-KR" smtClean="0"/>
+              <a:pPr>
+                <a:defRPr/>
+              </a:pPr>
+              <a:t>4</a:t>
+            </a:fld>
+            <a:endParaRPr lang="en-US" altLang="ko-KR" dirty="0"/>
+          </a:p>
+        </p:txBody>
+      </p:sp>
+    </p:spTree>
+    <p:extLst>
+      <p:ext uri="{BB962C8B-B14F-4D97-AF65-F5344CB8AC3E}">
+        <p14:creationId xmlns:p14="http://schemas.microsoft.com/office/powerpoint/2010/main" val="348425802"/>
+      </p:ext>
+    </p:extLst>
+  </p:cSld>
+  <p:clrMapOvr>
+    <a:masterClrMapping/>
+  </p:clrMapOvr>
+</p:notes>
+</file>
+
+<file path=ppt/notesSlides/notesSlide6.xml><?xml version="1.0" encoding="utf-8"?>
+<p:notes xmlns:a="http://schemas.openxmlformats.org/drawingml/2006/main" xmlns:r="http://schemas.openxmlformats.org/officeDocument/2006/relationships" xmlns:p="http://schemas.openxmlformats.org/presentationml/2006/main">
+  <p:cSld>
+    <p:spTree>
+      <p:nvGrpSpPr>
+        <p:cNvPr id="1" name=""/>
+        <p:cNvGrpSpPr/>
+        <p:nvPr/>
+      </p:nvGrpSpPr>
+      <p:grpSpPr>
+        <a:xfrm>
+          <a:off x="0" y="0"/>
+          <a:ext cx="0" cy="0"/>
+          <a:chOff x="0" y="0"/>
+          <a:chExt cx="0" cy="0"/>
+        </a:xfrm>
+      </p:grpSpPr>
+      <p:sp>
+        <p:nvSpPr>
+          <p:cNvPr id="2" name="슬라이드 이미지 개체 틀 1"/>
+          <p:cNvSpPr>
+            <a:spLocks noGrp="1" noRot="1" noChangeAspect="1"/>
+          </p:cNvSpPr>
+          <p:nvPr>
+            <p:ph type="sldImg"/>
+          </p:nvPr>
+        </p:nvSpPr>
+        <p:spPr/>
+      </p:sp>
+      <p:sp>
+        <p:nvSpPr>
+          <p:cNvPr id="3" name="슬라이드 노트 개체 틀 2"/>
+          <p:cNvSpPr>
+            <a:spLocks noGrp="1"/>
+          </p:cNvSpPr>
+          <p:nvPr>
+            <p:ph type="body" idx="1"/>
+          </p:nvPr>
+        </p:nvSpPr>
+        <p:spPr/>
+        <p:txBody>
+          <a:bodyPr/>
+          <a:lstStyle/>
+          <a:p>
+            <a:endParaRPr lang="en-US" altLang="ko-KR" dirty="0"/>
+          </a:p>
+        </p:txBody>
+      </p:sp>
+      <p:sp>
+        <p:nvSpPr>
+          <p:cNvPr id="4" name="슬라이드 번호 개체 틀 3"/>
+          <p:cNvSpPr>
+            <a:spLocks noGrp="1"/>
+          </p:cNvSpPr>
+          <p:nvPr>
+            <p:ph type="sldNum" sz="quarter" idx="10"/>
+          </p:nvPr>
+        </p:nvSpPr>
+        <p:spPr/>
+        <p:txBody>
+          <a:bodyPr/>
+          <a:lstStyle/>
+          <a:p>
+            <a:pPr>
+              <a:defRPr/>
+            </a:pPr>
+            <a:fld id="{107C636C-D4EC-469F-9D4E-6014B0837E4A}" type="slidenum">
+              <a:rPr lang="en-US" altLang="ko-KR" smtClean="0"/>
+              <a:pPr>
+                <a:defRPr/>
+              </a:pPr>
+              <a:t>5</a:t>
             </a:fld>
             <a:endParaRPr lang="en-US" altLang="ko-KR" dirty="0"/>
           </a:p>
@@ -3883,6 +4065,185 @@
               <a:t>Simulated Annealing</a:t>
             </a:r>
           </a:p>
+          <a:p>
+            <a:pPr lvl="1"/>
+            <a:endParaRPr lang="en-US" altLang="ko-KR" dirty="0">
+              <a:latin typeface="Malgun Gothic" charset="-127"/>
+              <a:ea typeface="Malgun Gothic" charset="-127"/>
+              <a:cs typeface="Malgun Gothic" charset="-127"/>
+            </a:endParaRPr>
+          </a:p>
+          <a:p>
+            <a:r>
+              <a:rPr lang="ko-KR" altLang="en-US" dirty="0" smtClean="0">
+                <a:latin typeface="Malgun Gothic" charset="-127"/>
+                <a:ea typeface="Malgun Gothic" charset="-127"/>
+                <a:cs typeface="Malgun Gothic" charset="-127"/>
+              </a:rPr>
+              <a:t>실험환경</a:t>
+            </a:r>
+            <a:endParaRPr lang="en-US" altLang="ko-KR" dirty="0" smtClean="0">
+              <a:latin typeface="Malgun Gothic" charset="-127"/>
+              <a:ea typeface="Malgun Gothic" charset="-127"/>
+              <a:cs typeface="Malgun Gothic" charset="-127"/>
+            </a:endParaRPr>
+          </a:p>
+          <a:p>
+            <a:pPr lvl="1"/>
+            <a:r>
+              <a:rPr lang="en-US" altLang="ko-KR" dirty="0" err="1" smtClean="0">
+                <a:latin typeface="Malgun Gothic" charset="-127"/>
+                <a:ea typeface="Malgun Gothic" charset="-127"/>
+                <a:cs typeface="Malgun Gothic" charset="-127"/>
+              </a:rPr>
+              <a:t>Weka</a:t>
+            </a:r>
+            <a:r>
+              <a:rPr lang="en-US" altLang="ko-KR" dirty="0" smtClean="0">
+                <a:latin typeface="Malgun Gothic" charset="-127"/>
+                <a:ea typeface="Malgun Gothic" charset="-127"/>
+                <a:cs typeface="Malgun Gothic" charset="-127"/>
+              </a:rPr>
+              <a:t>(Version : 3.6.13)</a:t>
+            </a:r>
+            <a:r>
+              <a:rPr lang="ko-KR" altLang="en-US" dirty="0" smtClean="0">
+                <a:latin typeface="Malgun Gothic" charset="-127"/>
+                <a:ea typeface="Malgun Gothic" charset="-127"/>
+                <a:cs typeface="Malgun Gothic" charset="-127"/>
+              </a:rPr>
+              <a:t>에서 데이터 </a:t>
+            </a:r>
+            <a:r>
+              <a:rPr lang="en-US" altLang="ko-KR" dirty="0" smtClean="0">
+                <a:latin typeface="Malgun Gothic" charset="-127"/>
+                <a:ea typeface="Malgun Gothic" charset="-127"/>
+                <a:cs typeface="Malgun Gothic" charset="-127"/>
+              </a:rPr>
+              <a:t>1000</a:t>
+            </a:r>
+            <a:r>
+              <a:rPr lang="ko-KR" altLang="en-US" dirty="0" smtClean="0">
+                <a:latin typeface="Malgun Gothic" charset="-127"/>
+                <a:ea typeface="Malgun Gothic" charset="-127"/>
+                <a:cs typeface="Malgun Gothic" charset="-127"/>
+              </a:rPr>
+              <a:t>개를 생성</a:t>
+            </a:r>
+            <a:endParaRPr lang="en-US" altLang="ko-KR" dirty="0">
+              <a:latin typeface="Malgun Gothic" charset="-127"/>
+              <a:ea typeface="Malgun Gothic" charset="-127"/>
+              <a:cs typeface="Malgun Gothic" charset="-127"/>
+            </a:endParaRPr>
+          </a:p>
+          <a:p>
+            <a:pPr lvl="1"/>
+            <a:r>
+              <a:rPr lang="en-US" altLang="ko-KR" dirty="0" smtClean="0">
+                <a:latin typeface="Malgun Gothic" charset="-127"/>
+                <a:ea typeface="Malgun Gothic" charset="-127"/>
+                <a:cs typeface="Malgun Gothic" charset="-127"/>
+              </a:rPr>
+              <a:t>Data preprocessing : Oversampling</a:t>
+            </a:r>
+            <a:r>
+              <a:rPr lang="ko-KR" altLang="en-US" dirty="0" smtClean="0">
+                <a:latin typeface="Malgun Gothic" charset="-127"/>
+                <a:ea typeface="Malgun Gothic" charset="-127"/>
+                <a:cs typeface="Malgun Gothic" charset="-127"/>
+              </a:rPr>
+              <a:t>을 이용해 </a:t>
+            </a:r>
+            <a:r>
+              <a:rPr lang="en-US" altLang="ko-KR" dirty="0" smtClean="0">
+                <a:latin typeface="Malgun Gothic" charset="-127"/>
+                <a:ea typeface="Malgun Gothic" charset="-127"/>
+                <a:cs typeface="Malgun Gothic" charset="-127"/>
+              </a:rPr>
+              <a:t>Target Attribute</a:t>
+            </a:r>
+            <a:r>
+              <a:rPr lang="ko-KR" altLang="en-US" dirty="0" smtClean="0">
+                <a:latin typeface="Malgun Gothic" charset="-127"/>
+                <a:ea typeface="Malgun Gothic" charset="-127"/>
+                <a:cs typeface="Malgun Gothic" charset="-127"/>
+              </a:rPr>
+              <a:t>의 값을 조정</a:t>
+            </a:r>
+            <a:r>
+              <a:rPr lang="en-US" altLang="ko-KR" dirty="0" smtClean="0">
+                <a:latin typeface="Malgun Gothic" charset="-127"/>
+                <a:ea typeface="Malgun Gothic" charset="-127"/>
+                <a:cs typeface="Malgun Gothic" charset="-127"/>
+              </a:rPr>
+              <a:t>(True : False = 1:100</a:t>
+            </a:r>
+            <a:r>
+              <a:rPr lang="ko-KR" altLang="en-US" dirty="0" smtClean="0">
+                <a:latin typeface="Malgun Gothic" charset="-127"/>
+                <a:ea typeface="Malgun Gothic" charset="-127"/>
+                <a:cs typeface="Malgun Gothic" charset="-127"/>
+              </a:rPr>
+              <a:t> </a:t>
+            </a:r>
+            <a:r>
+              <a:rPr lang="ko-KR" altLang="en-US" dirty="0" smtClean="0">
+                <a:latin typeface="Malgun Gothic" charset="-127"/>
+                <a:ea typeface="Malgun Gothic" charset="-127"/>
+                <a:cs typeface="Malgun Gothic" charset="-127"/>
+                <a:sym typeface="Wingdings"/>
+              </a:rPr>
+              <a:t> </a:t>
+            </a:r>
+            <a:r>
+              <a:rPr lang="en-US" altLang="ko-KR" dirty="0" smtClean="0">
+                <a:latin typeface="Malgun Gothic" charset="-127"/>
+                <a:ea typeface="Malgun Gothic" charset="-127"/>
+                <a:cs typeface="Malgun Gothic" charset="-127"/>
+                <a:sym typeface="Wingdings"/>
+              </a:rPr>
+              <a:t>1:1)</a:t>
+            </a:r>
+          </a:p>
+          <a:p>
+            <a:pPr lvl="1"/>
+            <a:r>
+              <a:rPr lang="en-US" altLang="ko-KR" dirty="0" smtClean="0">
+                <a:latin typeface="Malgun Gothic" charset="-127"/>
+                <a:ea typeface="Malgun Gothic" charset="-127"/>
+                <a:cs typeface="Malgun Gothic" charset="-127"/>
+                <a:sym typeface="Wingdings"/>
+              </a:rPr>
+              <a:t>Correctly Classified Instances</a:t>
+            </a:r>
+            <a:r>
+              <a:rPr lang="ko-KR" altLang="en-US" dirty="0" smtClean="0">
+                <a:latin typeface="Malgun Gothic" charset="-127"/>
+                <a:ea typeface="Malgun Gothic" charset="-127"/>
+                <a:cs typeface="Malgun Gothic" charset="-127"/>
+                <a:sym typeface="Wingdings"/>
+              </a:rPr>
+              <a:t>를 기준으로 알고리즘 선택</a:t>
+            </a:r>
+            <a:r>
+              <a:rPr lang="en-US" altLang="ko-KR" dirty="0" smtClean="0">
+                <a:latin typeface="Malgun Gothic" charset="-127"/>
+                <a:ea typeface="Malgun Gothic" charset="-127"/>
+                <a:cs typeface="Malgun Gothic" charset="-127"/>
+                <a:sym typeface="Wingdings"/>
+              </a:rPr>
+              <a:t>.</a:t>
+            </a:r>
+          </a:p>
+          <a:p>
+            <a:pPr lvl="1"/>
+            <a:endParaRPr lang="en-US" altLang="ko-KR" dirty="0" smtClean="0">
+              <a:latin typeface="Malgun Gothic" charset="-127"/>
+              <a:ea typeface="Malgun Gothic" charset="-127"/>
+              <a:cs typeface="Malgun Gothic" charset="-127"/>
+              <a:sym typeface="Wingdings"/>
+            </a:endParaRPr>
+          </a:p>
         </p:txBody>
       </p:sp>
     </p:spTree>
@@ -3942,7 +4303,7 @@
                 <a:latin typeface="맑은 고딕" pitchFamily="50" charset="-127"/>
                 <a:ea typeface="맑은 고딕" pitchFamily="50" charset="-127"/>
               </a:rPr>
-              <a:t>실험</a:t>
+              <a:t>실험 결과</a:t>
             </a:r>
             <a:endParaRPr lang="ko-KR" altLang="en-US" b="1" dirty="0">
               <a:latin typeface="맑은 고딕" pitchFamily="50" charset="-127"/>
@@ -4028,343 +4389,494 @@
           <a:effectLst/>
         </p:spPr>
       </p:cxnSp>
-      <p:graphicFrame>
-        <p:nvGraphicFramePr>
-          <p:cNvPr id="7" name="내용 개체 틀 6"/>
-          <p:cNvGraphicFramePr>
-            <a:graphicFrameLocks noGrp="1"/>
-          </p:cNvGraphicFramePr>
+      <p:sp>
+        <p:nvSpPr>
+          <p:cNvPr id="3" name="내용 개체 틀 2"/>
+          <p:cNvSpPr>
+            <a:spLocks noGrp="1"/>
+          </p:cNvSpPr>
           <p:nvPr>
             <p:ph idx="1"/>
-            <p:extLst>
-              <p:ext uri="{D42A27DB-BD31-4B8C-83A1-F6EECF244321}">
-                <p14:modId xmlns:p14="http://schemas.microsoft.com/office/powerpoint/2010/main" val="1099778500"/>
-              </p:ext>
-            </p:extLst>
           </p:nvPr>
-        </p:nvGraphicFramePr>
-        <p:xfrm>
-          <a:off x="457200" y="1676400"/>
-          <a:ext cx="8229600" cy="1854200"/>
-        </p:xfrm>
-        <a:graphic>
-          <a:graphicData uri="http://schemas.openxmlformats.org/drawingml/2006/table">
-            <a:tbl>
-              <a:tblPr firstRow="1" bandRow="1">
-                <a:tableStyleId>{21E4AEA4-8DFA-4A89-87EB-49C32662AFE0}</a:tableStyleId>
-              </a:tblPr>
-              <a:tblGrid>
-                <a:gridCol w="2362200"/>
-                <a:gridCol w="2895600"/>
-                <a:gridCol w="2971800"/>
-              </a:tblGrid>
-              <a:tr h="370840">
-                <a:tc>
-                  <a:txBody>
-                    <a:bodyPr/>
-                    <a:lstStyle/>
-                    <a:p>
-                      <a:pPr algn="ctr" latinLnBrk="1"/>
-                      <a:r>
-                        <a:rPr lang="ko-KR" altLang="en-US" dirty="0" smtClean="0">
-                          <a:latin typeface="+mj-lt"/>
-                          <a:ea typeface="Malgun Gothic" charset="-127"/>
-                          <a:cs typeface="Malgun Gothic" charset="-127"/>
-                        </a:rPr>
-                        <a:t>알고리즘</a:t>
-                      </a:r>
-                      <a:endParaRPr lang="ko-KR" altLang="en-US" dirty="0">
-                        <a:latin typeface="+mj-lt"/>
-                        <a:ea typeface="Malgun Gothic" charset="-127"/>
-                        <a:cs typeface="Malgun Gothic" charset="-127"/>
-                      </a:endParaRPr>
-                    </a:p>
-                  </a:txBody>
-                  <a:tcPr/>
-                </a:tc>
-                <a:tc>
-                  <a:txBody>
-                    <a:bodyPr/>
-                    <a:lstStyle/>
-                    <a:p>
-                      <a:pPr algn="ctr" latinLnBrk="1"/>
-                      <a:r>
-                        <a:rPr lang="en-US" altLang="ko-KR" sz="1600" dirty="0" smtClean="0">
-                          <a:latin typeface="+mj-lt"/>
-                          <a:ea typeface="Malgun Gothic" charset="-127"/>
-                          <a:cs typeface="Malgun Gothic" charset="-127"/>
-                        </a:rPr>
-                        <a:t>Correctly</a:t>
-                      </a:r>
-                      <a:r>
-                        <a:rPr lang="en-US" altLang="ko-KR" sz="1600" baseline="0" dirty="0" smtClean="0">
-                          <a:latin typeface="+mj-lt"/>
-                          <a:ea typeface="Malgun Gothic" charset="-127"/>
-                          <a:cs typeface="Malgun Gothic" charset="-127"/>
-                        </a:rPr>
-                        <a:t> Classified Instance</a:t>
-                      </a:r>
-                      <a:endParaRPr lang="ko-KR" altLang="en-US" sz="1600" dirty="0">
-                        <a:latin typeface="+mj-lt"/>
-                        <a:ea typeface="Malgun Gothic" charset="-127"/>
-                        <a:cs typeface="Malgun Gothic" charset="-127"/>
-                      </a:endParaRPr>
-                    </a:p>
-                  </a:txBody>
-                  <a:tcPr/>
-                </a:tc>
-                <a:tc>
-                  <a:txBody>
-                    <a:bodyPr/>
-                    <a:lstStyle/>
-                    <a:p>
-                      <a:pPr algn="ctr" latinLnBrk="1"/>
-                      <a:r>
-                        <a:rPr lang="en-US" altLang="ko-KR" dirty="0" smtClean="0">
-                          <a:latin typeface="+mj-lt"/>
-                          <a:ea typeface="Malgun Gothic" charset="-127"/>
-                          <a:cs typeface="Malgun Gothic" charset="-127"/>
-                        </a:rPr>
-                        <a:t>Log</a:t>
-                      </a:r>
-                      <a:endParaRPr lang="ko-KR" altLang="en-US" dirty="0">
-                        <a:latin typeface="+mj-lt"/>
-                        <a:ea typeface="Malgun Gothic" charset="-127"/>
-                        <a:cs typeface="Malgun Gothic" charset="-127"/>
-                      </a:endParaRPr>
-                    </a:p>
-                  </a:txBody>
-                  <a:tcPr/>
-                </a:tc>
-              </a:tr>
-              <a:tr h="370840">
-                <a:tc>
-                  <a:txBody>
-                    <a:bodyPr/>
-                    <a:lstStyle/>
-                    <a:p>
-                      <a:pPr algn="ctr" latinLnBrk="1"/>
-                      <a:r>
-                        <a:rPr lang="en-US" altLang="ko-KR" dirty="0" smtClean="0">
-                          <a:latin typeface="Malgun Gothic" charset="-127"/>
-                          <a:ea typeface="Malgun Gothic" charset="-127"/>
-                          <a:cs typeface="Malgun Gothic" charset="-127"/>
-                        </a:rPr>
-                        <a:t>K2</a:t>
-                      </a:r>
-                      <a:endParaRPr lang="ko-KR" altLang="en-US" dirty="0">
-                        <a:latin typeface="Malgun Gothic" charset="-127"/>
-                        <a:ea typeface="Malgun Gothic" charset="-127"/>
-                        <a:cs typeface="Malgun Gothic" charset="-127"/>
-                      </a:endParaRPr>
-                    </a:p>
-                  </a:txBody>
-                  <a:tcPr/>
-                </a:tc>
-                <a:tc>
-                  <a:txBody>
-                    <a:bodyPr/>
-                    <a:lstStyle/>
-                    <a:p>
-                      <a:pPr algn="ctr" latinLnBrk="1"/>
-                      <a:endParaRPr lang="ko-KR" altLang="en-US" dirty="0">
-                        <a:latin typeface="Malgun Gothic" charset="-127"/>
-                        <a:ea typeface="Malgun Gothic" charset="-127"/>
-                        <a:cs typeface="Malgun Gothic" charset="-127"/>
-                      </a:endParaRPr>
-                    </a:p>
-                  </a:txBody>
-                  <a:tcPr/>
-                </a:tc>
-                <a:tc>
-                  <a:txBody>
-                    <a:bodyPr/>
-                    <a:lstStyle/>
-                    <a:p>
-                      <a:pPr algn="ctr" latinLnBrk="1"/>
-                      <a:endParaRPr lang="ko-KR" altLang="en-US">
-                        <a:latin typeface="Malgun Gothic" charset="-127"/>
-                        <a:ea typeface="Malgun Gothic" charset="-127"/>
-                        <a:cs typeface="Malgun Gothic" charset="-127"/>
-                      </a:endParaRPr>
-                    </a:p>
-                  </a:txBody>
-                  <a:tcPr/>
-                </a:tc>
-              </a:tr>
-              <a:tr h="370840">
-                <a:tc>
-                  <a:txBody>
-                    <a:bodyPr/>
-                    <a:lstStyle/>
-                    <a:p>
-                      <a:pPr algn="ctr" latinLnBrk="1"/>
-                      <a:r>
-                        <a:rPr lang="en-US" altLang="ko-KR" dirty="0" err="1" smtClean="0">
-                          <a:latin typeface="Malgun Gothic" charset="-127"/>
-                          <a:ea typeface="Malgun Gothic" charset="-127"/>
-                          <a:cs typeface="Malgun Gothic" charset="-127"/>
-                        </a:rPr>
-                        <a:t>Tabu</a:t>
-                      </a:r>
-                      <a:endParaRPr lang="ko-KR" altLang="en-US" dirty="0">
-                        <a:latin typeface="Malgun Gothic" charset="-127"/>
-                        <a:ea typeface="Malgun Gothic" charset="-127"/>
-                        <a:cs typeface="Malgun Gothic" charset="-127"/>
-                      </a:endParaRPr>
-                    </a:p>
-                  </a:txBody>
-                  <a:tcPr/>
-                </a:tc>
-                <a:tc>
-                  <a:txBody>
-                    <a:bodyPr/>
-                    <a:lstStyle/>
-                    <a:p>
-                      <a:pPr algn="ctr" latinLnBrk="1"/>
-                      <a:endParaRPr lang="ko-KR" altLang="en-US" dirty="0">
-                        <a:latin typeface="Malgun Gothic" charset="-127"/>
-                        <a:ea typeface="Malgun Gothic" charset="-127"/>
-                        <a:cs typeface="Malgun Gothic" charset="-127"/>
-                      </a:endParaRPr>
-                    </a:p>
-                  </a:txBody>
-                  <a:tcPr/>
-                </a:tc>
-                <a:tc>
-                  <a:txBody>
-                    <a:bodyPr/>
-                    <a:lstStyle/>
-                    <a:p>
-                      <a:pPr algn="ctr" latinLnBrk="1"/>
-                      <a:endParaRPr lang="ko-KR" altLang="en-US" dirty="0">
-                        <a:latin typeface="Malgun Gothic" charset="-127"/>
-                        <a:ea typeface="Malgun Gothic" charset="-127"/>
-                        <a:cs typeface="Malgun Gothic" charset="-127"/>
-                      </a:endParaRPr>
-                    </a:p>
-                  </a:txBody>
-                  <a:tcPr/>
-                </a:tc>
-              </a:tr>
-              <a:tr h="370840">
-                <a:tc>
-                  <a:txBody>
-                    <a:bodyPr/>
-                    <a:lstStyle/>
-                    <a:p>
-                      <a:pPr algn="ctr" latinLnBrk="1"/>
-                      <a:r>
-                        <a:rPr lang="en-US" altLang="ko-KR" dirty="0" smtClean="0">
-                          <a:latin typeface="Malgun Gothic" charset="-127"/>
-                          <a:ea typeface="Malgun Gothic" charset="-127"/>
-                          <a:cs typeface="Malgun Gothic" charset="-127"/>
-                        </a:rPr>
-                        <a:t>Hill Climber</a:t>
-                      </a:r>
-                      <a:endParaRPr lang="ko-KR" altLang="en-US" dirty="0">
-                        <a:latin typeface="Malgun Gothic" charset="-127"/>
-                        <a:ea typeface="Malgun Gothic" charset="-127"/>
-                        <a:cs typeface="Malgun Gothic" charset="-127"/>
-                      </a:endParaRPr>
-                    </a:p>
-                  </a:txBody>
-                  <a:tcPr/>
-                </a:tc>
-                <a:tc>
-                  <a:txBody>
-                    <a:bodyPr/>
-                    <a:lstStyle/>
-                    <a:p>
-                      <a:pPr algn="ctr" latinLnBrk="1"/>
-                      <a:endParaRPr lang="ko-KR" altLang="en-US" dirty="0">
-                        <a:latin typeface="Malgun Gothic" charset="-127"/>
-                        <a:ea typeface="Malgun Gothic" charset="-127"/>
-                        <a:cs typeface="Malgun Gothic" charset="-127"/>
-                      </a:endParaRPr>
-                    </a:p>
-                  </a:txBody>
-                  <a:tcPr/>
-                </a:tc>
-                <a:tc>
-                  <a:txBody>
-                    <a:bodyPr/>
-                    <a:lstStyle/>
-                    <a:p>
-                      <a:pPr algn="ctr" latinLnBrk="1"/>
-                      <a:endParaRPr lang="ko-KR" altLang="en-US" dirty="0">
-                        <a:latin typeface="Malgun Gothic" charset="-127"/>
-                        <a:ea typeface="Malgun Gothic" charset="-127"/>
-                        <a:cs typeface="Malgun Gothic" charset="-127"/>
-                      </a:endParaRPr>
-                    </a:p>
-                  </a:txBody>
-                  <a:tcPr/>
-                </a:tc>
-              </a:tr>
-              <a:tr h="370840">
-                <a:tc>
-                  <a:txBody>
-                    <a:bodyPr/>
-                    <a:lstStyle/>
-                    <a:p>
-                      <a:pPr algn="ctr" latinLnBrk="1"/>
-                      <a:r>
-                        <a:rPr lang="en-US" altLang="ko-KR" dirty="0" smtClean="0">
-                          <a:latin typeface="Malgun Gothic" charset="-127"/>
-                          <a:ea typeface="Malgun Gothic" charset="-127"/>
-                          <a:cs typeface="Malgun Gothic" charset="-127"/>
-                        </a:rPr>
-                        <a:t>Simulated Annealing</a:t>
-                      </a:r>
-                      <a:endParaRPr lang="ko-KR" altLang="en-US" dirty="0">
-                        <a:latin typeface="Malgun Gothic" charset="-127"/>
-                        <a:ea typeface="Malgun Gothic" charset="-127"/>
-                        <a:cs typeface="Malgun Gothic" charset="-127"/>
-                      </a:endParaRPr>
-                    </a:p>
-                  </a:txBody>
-                  <a:tcPr/>
-                </a:tc>
-                <a:tc>
-                  <a:txBody>
-                    <a:bodyPr/>
-                    <a:lstStyle/>
-                    <a:p>
-                      <a:pPr algn="ctr" latinLnBrk="1"/>
-                      <a:endParaRPr lang="ko-KR" altLang="en-US">
-                        <a:latin typeface="Malgun Gothic" charset="-127"/>
-                        <a:ea typeface="Malgun Gothic" charset="-127"/>
-                        <a:cs typeface="Malgun Gothic" charset="-127"/>
-                      </a:endParaRPr>
-                    </a:p>
-                  </a:txBody>
-                  <a:tcPr/>
-                </a:tc>
-                <a:tc>
-                  <a:txBody>
-                    <a:bodyPr/>
-                    <a:lstStyle/>
-                    <a:p>
-                      <a:pPr algn="ctr" latinLnBrk="1"/>
-                      <a:endParaRPr lang="ko-KR" altLang="en-US" dirty="0">
-                        <a:latin typeface="Malgun Gothic" charset="-127"/>
-                        <a:ea typeface="Malgun Gothic" charset="-127"/>
-                        <a:cs typeface="Malgun Gothic" charset="-127"/>
-                      </a:endParaRPr>
-                    </a:p>
-                  </a:txBody>
-                  <a:tcPr/>
-                </a:tc>
-              </a:tr>
-            </a:tbl>
-          </a:graphicData>
-        </a:graphic>
-      </p:graphicFrame>
+        </p:nvSpPr>
+        <p:spPr>
+          <a:xfrm>
+            <a:off x="457200" y="1143000"/>
+            <a:ext cx="4343400" cy="2438401"/>
+          </a:xfrm>
+        </p:spPr>
+        <p:txBody>
+          <a:bodyPr/>
+          <a:lstStyle/>
+          <a:p>
+            <a:pPr marL="0" marR="0" lvl="0" indent="0" defTabSz="914400" eaLnBrk="1" fontAlgn="auto" latinLnBrk="0" hangingPunct="1">
+              <a:spcBef>
+                <a:spcPts val="0"/>
+              </a:spcBef>
+              <a:spcAft>
+                <a:spcPts val="0"/>
+              </a:spcAft>
+              <a:buClrTx/>
+              <a:buSzTx/>
+              <a:buFontTx/>
+              <a:buNone/>
+              <a:tabLst/>
+              <a:defRPr/>
+            </a:pPr>
+            <a:r>
+              <a:rPr lang="en-US" altLang="ko-KR" b="1" dirty="0" smtClean="0">
+                <a:latin typeface="Malgun Gothic" charset="-127"/>
+                <a:ea typeface="Malgun Gothic" charset="-127"/>
+                <a:cs typeface="Malgun Gothic" charset="-127"/>
+                <a:sym typeface="Wingdings"/>
+              </a:rPr>
+              <a:t>K2 Algorithm</a:t>
+            </a:r>
+          </a:p>
+          <a:p>
+            <a:pPr eaLnBrk="1" fontAlgn="auto" latinLnBrk="0" hangingPunct="1">
+              <a:lnSpc>
+                <a:spcPct val="200000"/>
+              </a:lnSpc>
+              <a:spcBef>
+                <a:spcPts val="0"/>
+              </a:spcBef>
+              <a:spcAft>
+                <a:spcPts val="0"/>
+              </a:spcAft>
+            </a:pPr>
+            <a:r>
+              <a:rPr lang="en-US" altLang="ko-KR" sz="1800" dirty="0" smtClean="0">
+                <a:latin typeface="Malgun Gothic" charset="-127"/>
+                <a:ea typeface="Malgun Gothic" charset="-127"/>
+                <a:cs typeface="Malgun Gothic" charset="-127"/>
+                <a:sym typeface="Wingdings"/>
+              </a:rPr>
+              <a:t>Correctly Classified Instances : </a:t>
+            </a:r>
+            <a:r>
+              <a:rPr lang="en-US" altLang="ko-KR" sz="1800" b="1" dirty="0" smtClean="0">
+                <a:latin typeface="Malgun Gothic" charset="-127"/>
+                <a:ea typeface="Malgun Gothic" charset="-127"/>
+                <a:cs typeface="Malgun Gothic" charset="-127"/>
+                <a:sym typeface="Wingdings"/>
+              </a:rPr>
+              <a:t>60%</a:t>
+            </a:r>
+          </a:p>
+          <a:p>
+            <a:pPr eaLnBrk="1" fontAlgn="auto" latinLnBrk="0" hangingPunct="1">
+              <a:lnSpc>
+                <a:spcPct val="150000"/>
+              </a:lnSpc>
+              <a:spcBef>
+                <a:spcPts val="0"/>
+              </a:spcBef>
+              <a:spcAft>
+                <a:spcPts val="0"/>
+              </a:spcAft>
+            </a:pPr>
+            <a:r>
+              <a:rPr lang="en-US" altLang="ko-KR" sz="1800" dirty="0" smtClean="0">
+                <a:latin typeface="Malgun Gothic" charset="-127"/>
+                <a:ea typeface="Malgun Gothic" charset="-127"/>
+                <a:cs typeface="Malgun Gothic" charset="-127"/>
+                <a:sym typeface="Wingdings"/>
+              </a:rPr>
+              <a:t>Options</a:t>
+            </a:r>
+          </a:p>
+          <a:p>
+            <a:pPr lvl="1" eaLnBrk="1" fontAlgn="auto" latinLnBrk="0" hangingPunct="1">
+              <a:lnSpc>
+                <a:spcPct val="150000"/>
+              </a:lnSpc>
+              <a:spcBef>
+                <a:spcPts val="0"/>
+              </a:spcBef>
+              <a:spcAft>
+                <a:spcPts val="0"/>
+              </a:spcAft>
+            </a:pPr>
+            <a:r>
+              <a:rPr lang="en-US" altLang="ko-KR" sz="1600" dirty="0" smtClean="0">
+                <a:latin typeface="Malgun Gothic" charset="-127"/>
+                <a:ea typeface="Malgun Gothic" charset="-127"/>
+                <a:cs typeface="Malgun Gothic" charset="-127"/>
+                <a:sym typeface="Wingdings"/>
+              </a:rPr>
+              <a:t>Max number of parents : 2</a:t>
+            </a:r>
+            <a:endParaRPr lang="en-US" altLang="ko-KR" sz="1600" dirty="0">
+              <a:latin typeface="Malgun Gothic" charset="-127"/>
+              <a:ea typeface="Malgun Gothic" charset="-127"/>
+              <a:cs typeface="Malgun Gothic" charset="-127"/>
+              <a:sym typeface="Wingdings"/>
+            </a:endParaRPr>
+          </a:p>
+        </p:txBody>
+      </p:sp>
+      <p:pic>
+        <p:nvPicPr>
+          <p:cNvPr id="6" name="그림 5"/>
+          <p:cNvPicPr>
+            <a:picLocks noChangeAspect="1"/>
+          </p:cNvPicPr>
+          <p:nvPr/>
+        </p:nvPicPr>
+        <p:blipFill>
+          <a:blip r:embed="rId3">
+            <a:extLst>
+              <a:ext uri="{28A0092B-C50C-407E-A947-70E740481C1C}">
+                <a14:useLocalDpi xmlns:a14="http://schemas.microsoft.com/office/drawing/2010/main" val="0"/>
+              </a:ext>
+            </a:extLst>
+          </a:blip>
+          <a:stretch>
+            <a:fillRect/>
+          </a:stretch>
+        </p:blipFill>
+        <p:spPr>
+          <a:xfrm>
+            <a:off x="4724400" y="1025705"/>
+            <a:ext cx="3371603" cy="2286001"/>
+          </a:xfrm>
+          <a:prstGeom prst="rect">
+            <a:avLst/>
+          </a:prstGeom>
+        </p:spPr>
+      </p:pic>
+      <p:sp>
+        <p:nvSpPr>
+          <p:cNvPr id="9" name="내용 개체 틀 2"/>
+          <p:cNvSpPr txBox="1">
+            <a:spLocks/>
+          </p:cNvSpPr>
+          <p:nvPr/>
+        </p:nvSpPr>
+        <p:spPr bwMode="auto">
+          <a:xfrm>
+            <a:off x="457200" y="3750624"/>
+            <a:ext cx="4343400" cy="2438401"/>
+          </a:xfrm>
+          <a:prstGeom prst="rect">
+            <a:avLst/>
+          </a:prstGeom>
+          <a:noFill/>
+          <a:ln w="9525">
+            <a:noFill/>
+            <a:miter lim="800000"/>
+            <a:headEnd/>
+            <a:tailEnd/>
+          </a:ln>
+        </p:spPr>
+        <p:txBody>
+          <a:bodyPr vert="horz" wrap="square" lIns="91440" tIns="45720" rIns="91440" bIns="45720" numCol="1" anchor="t" anchorCtr="0" compatLnSpc="1">
+            <a:prstTxWarp prst="textNoShape">
+              <a:avLst/>
+            </a:prstTxWarp>
+          </a:bodyPr>
+          <a:lstStyle>
+            <a:lvl1pPr marL="176213" indent="-176213" algn="l" rtl="0" eaLnBrk="0" fontAlgn="base" latinLnBrk="1" hangingPunct="0">
+              <a:spcBef>
+                <a:spcPct val="20000"/>
+              </a:spcBef>
+              <a:spcAft>
+                <a:spcPct val="0"/>
+              </a:spcAft>
+              <a:buChar char="•"/>
+              <a:defRPr kumimoji="1" sz="2000" b="0">
+                <a:solidFill>
+                  <a:schemeClr val="tx1"/>
+                </a:solidFill>
+                <a:latin typeface="Arial" pitchFamily="34" charset="0"/>
+                <a:ea typeface="HY견고딕" pitchFamily="18" charset="-127"/>
+                <a:cs typeface="Arial" pitchFamily="34" charset="0"/>
+              </a:defRPr>
+            </a:lvl1pPr>
+            <a:lvl2pPr marL="539750" indent="-184150" algn="l" rtl="0" eaLnBrk="0" fontAlgn="base" latinLnBrk="1" hangingPunct="0">
+              <a:spcBef>
+                <a:spcPct val="20000"/>
+              </a:spcBef>
+              <a:spcAft>
+                <a:spcPct val="0"/>
+              </a:spcAft>
+              <a:buChar char="–"/>
+              <a:defRPr kumimoji="1" sz="1800" b="0">
+                <a:solidFill>
+                  <a:srgbClr val="000066"/>
+                </a:solidFill>
+                <a:latin typeface="Arial" pitchFamily="34" charset="0"/>
+                <a:ea typeface="HY견고딕" pitchFamily="18" charset="-127"/>
+                <a:cs typeface="Arial" pitchFamily="34" charset="0"/>
+              </a:defRPr>
+            </a:lvl2pPr>
+            <a:lvl3pPr marL="892175" indent="-173038" algn="l" rtl="0" eaLnBrk="0" fontAlgn="base" latinLnBrk="1" hangingPunct="0">
+              <a:spcBef>
+                <a:spcPct val="20000"/>
+              </a:spcBef>
+              <a:spcAft>
+                <a:spcPct val="0"/>
+              </a:spcAft>
+              <a:buChar char="•"/>
+              <a:defRPr kumimoji="1" sz="1400" b="0">
+                <a:solidFill>
+                  <a:schemeClr val="tx1">
+                    <a:lumMod val="65000"/>
+                    <a:lumOff val="35000"/>
+                  </a:schemeClr>
+                </a:solidFill>
+                <a:latin typeface="Arial" pitchFamily="34" charset="0"/>
+                <a:ea typeface="HY견고딕" pitchFamily="18" charset="-127"/>
+                <a:cs typeface="Arial" pitchFamily="34" charset="0"/>
+              </a:defRPr>
+            </a:lvl3pPr>
+            <a:lvl4pPr marL="1252538" indent="-176213" algn="l" rtl="0" eaLnBrk="0" fontAlgn="base" latinLnBrk="1" hangingPunct="0">
+              <a:spcBef>
+                <a:spcPct val="20000"/>
+              </a:spcBef>
+              <a:spcAft>
+                <a:spcPct val="0"/>
+              </a:spcAft>
+              <a:buChar char="–"/>
+              <a:defRPr kumimoji="1" sz="1400" b="0">
+                <a:solidFill>
+                  <a:srgbClr val="003300"/>
+                </a:solidFill>
+                <a:latin typeface="Arial" pitchFamily="34" charset="0"/>
+                <a:ea typeface="HY견고딕" pitchFamily="18" charset="-127"/>
+                <a:cs typeface="Arial" pitchFamily="34" charset="0"/>
+              </a:defRPr>
+            </a:lvl4pPr>
+            <a:lvl5pPr marL="1619250" indent="-187325" algn="l" rtl="0" eaLnBrk="0" fontAlgn="base" latinLnBrk="1" hangingPunct="0">
+              <a:spcBef>
+                <a:spcPct val="20000"/>
+              </a:spcBef>
+              <a:spcAft>
+                <a:spcPct val="0"/>
+              </a:spcAft>
+              <a:buChar char="»"/>
+              <a:defRPr kumimoji="1" sz="1400" b="0">
+                <a:solidFill>
+                  <a:srgbClr val="003366"/>
+                </a:solidFill>
+                <a:latin typeface="Arial" pitchFamily="34" charset="0"/>
+                <a:ea typeface="HY견고딕" pitchFamily="18" charset="-127"/>
+                <a:cs typeface="Arial" pitchFamily="34" charset="0"/>
+              </a:defRPr>
+            </a:lvl5pPr>
+            <a:lvl6pPr marL="2076450" indent="-187325" algn="l" rtl="0" fontAlgn="base" latinLnBrk="1">
+              <a:spcBef>
+                <a:spcPct val="20000"/>
+              </a:spcBef>
+              <a:spcAft>
+                <a:spcPct val="0"/>
+              </a:spcAft>
+              <a:buChar char="»"/>
+              <a:defRPr kumimoji="1" sz="1200">
+                <a:solidFill>
+                  <a:srgbClr val="003366"/>
+                </a:solidFill>
+                <a:latin typeface="+mn-lt"/>
+                <a:ea typeface="+mn-ea"/>
+              </a:defRPr>
+            </a:lvl6pPr>
+            <a:lvl7pPr marL="2533650" indent="-187325" algn="l" rtl="0" fontAlgn="base" latinLnBrk="1">
+              <a:spcBef>
+                <a:spcPct val="20000"/>
+              </a:spcBef>
+              <a:spcAft>
+                <a:spcPct val="0"/>
+              </a:spcAft>
+              <a:buChar char="»"/>
+              <a:defRPr kumimoji="1" sz="1200">
+                <a:solidFill>
+                  <a:srgbClr val="003366"/>
+                </a:solidFill>
+                <a:latin typeface="+mn-lt"/>
+                <a:ea typeface="+mn-ea"/>
+              </a:defRPr>
+            </a:lvl7pPr>
+            <a:lvl8pPr marL="2990850" indent="-187325" algn="l" rtl="0" fontAlgn="base" latinLnBrk="1">
+              <a:spcBef>
+                <a:spcPct val="20000"/>
+              </a:spcBef>
+              <a:spcAft>
+                <a:spcPct val="0"/>
+              </a:spcAft>
+              <a:buChar char="»"/>
+              <a:defRPr kumimoji="1" sz="1200">
+                <a:solidFill>
+                  <a:srgbClr val="003366"/>
+                </a:solidFill>
+                <a:latin typeface="+mn-lt"/>
+                <a:ea typeface="+mn-ea"/>
+              </a:defRPr>
+            </a:lvl8pPr>
+            <a:lvl9pPr marL="3448050" indent="-187325" algn="l" rtl="0" fontAlgn="base" latinLnBrk="1">
+              <a:spcBef>
+                <a:spcPct val="20000"/>
+              </a:spcBef>
+              <a:spcAft>
+                <a:spcPct val="0"/>
+              </a:spcAft>
+              <a:buChar char="»"/>
+              <a:defRPr kumimoji="1" sz="1200">
+                <a:solidFill>
+                  <a:srgbClr val="003366"/>
+                </a:solidFill>
+                <a:latin typeface="+mn-lt"/>
+                <a:ea typeface="+mn-ea"/>
+              </a:defRPr>
+            </a:lvl9pPr>
+          </a:lstStyle>
+          <a:p>
+            <a:pPr marL="0" indent="0" eaLnBrk="1" fontAlgn="auto" latinLnBrk="0" hangingPunct="1">
+              <a:spcBef>
+                <a:spcPts val="0"/>
+              </a:spcBef>
+              <a:spcAft>
+                <a:spcPts val="0"/>
+              </a:spcAft>
+              <a:buFontTx/>
+              <a:buNone/>
+            </a:pPr>
+            <a:r>
+              <a:rPr lang="en-US" altLang="ko-KR" b="1" kern="0" dirty="0" err="1" smtClean="0">
+                <a:latin typeface="Malgun Gothic" charset="-127"/>
+                <a:ea typeface="Malgun Gothic" charset="-127"/>
+                <a:cs typeface="Malgun Gothic" charset="-127"/>
+                <a:sym typeface="Wingdings"/>
+              </a:rPr>
+              <a:t>Tabu</a:t>
+            </a:r>
+            <a:r>
+              <a:rPr lang="en-US" altLang="ko-KR" b="1" kern="0" dirty="0" smtClean="0">
+                <a:latin typeface="Malgun Gothic" charset="-127"/>
+                <a:ea typeface="Malgun Gothic" charset="-127"/>
+                <a:cs typeface="Malgun Gothic" charset="-127"/>
+                <a:sym typeface="Wingdings"/>
+              </a:rPr>
+              <a:t> Algorithm</a:t>
+            </a:r>
+          </a:p>
+          <a:p>
+            <a:pPr eaLnBrk="1" fontAlgn="auto" latinLnBrk="0" hangingPunct="1">
+              <a:lnSpc>
+                <a:spcPct val="200000"/>
+              </a:lnSpc>
+              <a:spcBef>
+                <a:spcPts val="0"/>
+              </a:spcBef>
+              <a:spcAft>
+                <a:spcPts val="0"/>
+              </a:spcAft>
+            </a:pPr>
+            <a:r>
+              <a:rPr lang="en-US" altLang="ko-KR" sz="1800" kern="0" dirty="0" smtClean="0">
+                <a:latin typeface="Malgun Gothic" charset="-127"/>
+                <a:ea typeface="Malgun Gothic" charset="-127"/>
+                <a:cs typeface="Malgun Gothic" charset="-127"/>
+                <a:sym typeface="Wingdings"/>
+              </a:rPr>
+              <a:t>Correctly Classified Instances : </a:t>
+            </a:r>
+            <a:r>
+              <a:rPr lang="en-US" altLang="ko-KR" sz="1800" b="1" kern="0" dirty="0" smtClean="0">
+                <a:latin typeface="Malgun Gothic" charset="-127"/>
+                <a:ea typeface="Malgun Gothic" charset="-127"/>
+                <a:cs typeface="Malgun Gothic" charset="-127"/>
+                <a:sym typeface="Wingdings"/>
+              </a:rPr>
+              <a:t>56%</a:t>
+            </a:r>
+          </a:p>
+          <a:p>
+            <a:pPr eaLnBrk="1" fontAlgn="auto" latinLnBrk="0" hangingPunct="1">
+              <a:lnSpc>
+                <a:spcPct val="150000"/>
+              </a:lnSpc>
+              <a:spcBef>
+                <a:spcPts val="0"/>
+              </a:spcBef>
+              <a:spcAft>
+                <a:spcPts val="0"/>
+              </a:spcAft>
+            </a:pPr>
+            <a:r>
+              <a:rPr lang="en-US" altLang="ko-KR" sz="1800" kern="0" dirty="0" smtClean="0">
+                <a:latin typeface="Malgun Gothic" charset="-127"/>
+                <a:ea typeface="Malgun Gothic" charset="-127"/>
+                <a:cs typeface="Malgun Gothic" charset="-127"/>
+                <a:sym typeface="Wingdings"/>
+              </a:rPr>
+              <a:t>Options</a:t>
+            </a:r>
+          </a:p>
+          <a:p>
+            <a:pPr lvl="1" eaLnBrk="1" fontAlgn="auto" latinLnBrk="0" hangingPunct="1">
+              <a:lnSpc>
+                <a:spcPct val="150000"/>
+              </a:lnSpc>
+              <a:spcBef>
+                <a:spcPts val="0"/>
+              </a:spcBef>
+              <a:spcAft>
+                <a:spcPts val="0"/>
+              </a:spcAft>
+            </a:pPr>
+            <a:r>
+              <a:rPr lang="en-US" altLang="ko-KR" sz="1600" kern="0" dirty="0" smtClean="0">
+                <a:latin typeface="Malgun Gothic" charset="-127"/>
+                <a:ea typeface="Malgun Gothic" charset="-127"/>
+                <a:cs typeface="Malgun Gothic" charset="-127"/>
+                <a:sym typeface="Wingdings"/>
+              </a:rPr>
+              <a:t>Max number of parents : 2</a:t>
+            </a:r>
+            <a:endParaRPr lang="en-US" altLang="ko-KR" sz="1600" kern="0" dirty="0">
+              <a:latin typeface="Malgun Gothic" charset="-127"/>
+              <a:ea typeface="Malgun Gothic" charset="-127"/>
+              <a:cs typeface="Malgun Gothic" charset="-127"/>
+              <a:sym typeface="Wingdings"/>
+            </a:endParaRPr>
+          </a:p>
+        </p:txBody>
+      </p:sp>
+      <p:pic>
+        <p:nvPicPr>
+          <p:cNvPr id="8" name="그림 7"/>
+          <p:cNvPicPr>
+            <a:picLocks noChangeAspect="1"/>
+          </p:cNvPicPr>
+          <p:nvPr/>
+        </p:nvPicPr>
+        <p:blipFill>
+          <a:blip r:embed="rId4">
+            <a:extLst>
+              <a:ext uri="{28A0092B-C50C-407E-A947-70E740481C1C}">
+                <a14:useLocalDpi xmlns:a14="http://schemas.microsoft.com/office/drawing/2010/main" val="0"/>
+              </a:ext>
+            </a:extLst>
+          </a:blip>
+          <a:stretch>
+            <a:fillRect/>
+          </a:stretch>
+        </p:blipFill>
+        <p:spPr>
+          <a:xfrm>
+            <a:off x="4886241" y="3637801"/>
+            <a:ext cx="3546475" cy="2664045"/>
+          </a:xfrm>
+          <a:prstGeom prst="rect">
+            <a:avLst/>
+          </a:prstGeom>
+        </p:spPr>
+      </p:pic>
     </p:spTree>
     <p:extLst>
       <p:ext uri="{BB962C8B-B14F-4D97-AF65-F5344CB8AC3E}">
-        <p14:creationId xmlns:p14="http://schemas.microsoft.com/office/powerpoint/2010/main" val="1058350932"/>
+        <p14:creationId xmlns:p14="http://schemas.microsoft.com/office/powerpoint/2010/main" val="1512286781"/>
       </p:ext>
     </p:extLst>
   </p:cSld>
@@ -4382,6 +4894,1030 @@
 </file>
 
 <file path=ppt/slides/slide4.xml><?xml version="1.0" encoding="utf-8"?>
+<p:sld xmlns:a="http://schemas.openxmlformats.org/drawingml/2006/main" xmlns:r="http://schemas.openxmlformats.org/officeDocument/2006/relationships" xmlns:p="http://schemas.openxmlformats.org/presentationml/2006/main">
+  <p:cSld>
+    <p:spTree>
+      <p:nvGrpSpPr>
+        <p:cNvPr id="1" name=""/>
+        <p:cNvGrpSpPr/>
+        <p:nvPr/>
+      </p:nvGrpSpPr>
+      <p:grpSpPr>
+        <a:xfrm>
+          <a:off x="0" y="0"/>
+          <a:ext cx="0" cy="0"/>
+          <a:chOff x="0" y="0"/>
+          <a:chExt cx="0" cy="0"/>
+        </a:xfrm>
+      </p:grpSpPr>
+      <p:sp>
+        <p:nvSpPr>
+          <p:cNvPr id="2" name="제목 1"/>
+          <p:cNvSpPr>
+            <a:spLocks noGrp="1"/>
+          </p:cNvSpPr>
+          <p:nvPr>
+            <p:ph type="title"/>
+          </p:nvPr>
+        </p:nvSpPr>
+        <p:spPr/>
+        <p:txBody>
+          <a:bodyPr/>
+          <a:lstStyle/>
+          <a:p>
+            <a:r>
+              <a:rPr lang="ko-KR" altLang="en-US" b="1" dirty="0" smtClean="0">
+                <a:latin typeface="맑은 고딕" pitchFamily="50" charset="-127"/>
+                <a:ea typeface="맑은 고딕" pitchFamily="50" charset="-127"/>
+              </a:rPr>
+              <a:t>실험 결과</a:t>
+            </a:r>
+            <a:endParaRPr lang="ko-KR" altLang="en-US" b="1" dirty="0">
+              <a:latin typeface="맑은 고딕" pitchFamily="50" charset="-127"/>
+              <a:ea typeface="맑은 고딕" pitchFamily="50" charset="-127"/>
+            </a:endParaRPr>
+          </a:p>
+        </p:txBody>
+      </p:sp>
+      <p:sp>
+        <p:nvSpPr>
+          <p:cNvPr id="4" name="슬라이드 번호 개체 틀 3"/>
+          <p:cNvSpPr>
+            <a:spLocks noGrp="1"/>
+          </p:cNvSpPr>
+          <p:nvPr>
+            <p:ph type="sldNum" sz="quarter" idx="10"/>
+          </p:nvPr>
+        </p:nvSpPr>
+        <p:spPr/>
+        <p:txBody>
+          <a:bodyPr/>
+          <a:lstStyle/>
+          <a:p>
+            <a:pPr>
+              <a:defRPr/>
+            </a:pPr>
+            <a:fld id="{D2F43F9C-7459-44BF-9323-EE784D731C4C}" type="slidenum">
+              <a:rPr lang="ko-KR" altLang="en-US" smtClean="0"/>
+              <a:pPr>
+                <a:defRPr/>
+              </a:pPr>
+              <a:t>3</a:t>
+            </a:fld>
+            <a:endParaRPr lang="en-US" altLang="ko-KR" dirty="0"/>
+          </a:p>
+        </p:txBody>
+      </p:sp>
+      <p:sp>
+        <p:nvSpPr>
+          <p:cNvPr id="5" name="텍스트 개체 틀 4"/>
+          <p:cNvSpPr>
+            <a:spLocks noGrp="1"/>
+          </p:cNvSpPr>
+          <p:nvPr>
+            <p:ph type="body" sz="quarter" idx="11"/>
+          </p:nvPr>
+        </p:nvSpPr>
+        <p:spPr/>
+        <p:txBody>
+          <a:bodyPr/>
+          <a:lstStyle/>
+          <a:p>
+            <a:endParaRPr lang="ko-KR" altLang="en-US" dirty="0"/>
+          </a:p>
+        </p:txBody>
+      </p:sp>
+      <p:cxnSp>
+        <p:nvCxnSpPr>
+          <p:cNvPr id="26" name="직선 화살표 연결선 25"/>
+          <p:cNvCxnSpPr/>
+          <p:nvPr/>
+        </p:nvCxnSpPr>
+        <p:spPr bwMode="auto">
+          <a:xfrm>
+            <a:off x="8534400" y="5791200"/>
+            <a:ext cx="152400" cy="0"/>
+          </a:xfrm>
+          <a:prstGeom prst="straightConnector1">
+            <a:avLst/>
+          </a:prstGeom>
+          <a:solidFill>
+            <a:schemeClr val="folHlink"/>
+          </a:solidFill>
+          <a:ln w="19050" cap="flat" cmpd="sng" algn="ctr">
+            <a:solidFill>
+              <a:schemeClr val="tx1"/>
+            </a:solidFill>
+            <a:prstDash val="solid"/>
+            <a:round/>
+            <a:headEnd type="none" w="med" len="med"/>
+            <a:tailEnd type="arrow"/>
+          </a:ln>
+          <a:effectLst/>
+        </p:spPr>
+      </p:cxnSp>
+      <p:sp>
+        <p:nvSpPr>
+          <p:cNvPr id="3" name="내용 개체 틀 2"/>
+          <p:cNvSpPr>
+            <a:spLocks noGrp="1"/>
+          </p:cNvSpPr>
+          <p:nvPr>
+            <p:ph idx="1"/>
+          </p:nvPr>
+        </p:nvSpPr>
+        <p:spPr>
+          <a:xfrm>
+            <a:off x="457200" y="1143000"/>
+            <a:ext cx="4343400" cy="2438401"/>
+          </a:xfrm>
+        </p:spPr>
+        <p:txBody>
+          <a:bodyPr/>
+          <a:lstStyle/>
+          <a:p>
+            <a:pPr marL="0" marR="0" lvl="0" indent="0" defTabSz="914400" eaLnBrk="1" fontAlgn="auto" latinLnBrk="0" hangingPunct="1">
+              <a:spcBef>
+                <a:spcPts val="0"/>
+              </a:spcBef>
+              <a:spcAft>
+                <a:spcPts val="0"/>
+              </a:spcAft>
+              <a:buClrTx/>
+              <a:buSzTx/>
+              <a:buFontTx/>
+              <a:buNone/>
+              <a:tabLst/>
+              <a:defRPr/>
+            </a:pPr>
+            <a:r>
+              <a:rPr lang="en-US" altLang="ko-KR" b="1" dirty="0" smtClean="0">
+                <a:latin typeface="Malgun Gothic" charset="-127"/>
+                <a:ea typeface="Malgun Gothic" charset="-127"/>
+                <a:cs typeface="Malgun Gothic" charset="-127"/>
+                <a:sym typeface="Wingdings"/>
+              </a:rPr>
+              <a:t>Hill Climber</a:t>
+            </a:r>
+          </a:p>
+          <a:p>
+            <a:pPr eaLnBrk="1" fontAlgn="auto" latinLnBrk="0" hangingPunct="1">
+              <a:lnSpc>
+                <a:spcPct val="200000"/>
+              </a:lnSpc>
+              <a:spcBef>
+                <a:spcPts val="0"/>
+              </a:spcBef>
+              <a:spcAft>
+                <a:spcPts val="0"/>
+              </a:spcAft>
+            </a:pPr>
+            <a:r>
+              <a:rPr lang="en-US" altLang="ko-KR" sz="1800" dirty="0" smtClean="0">
+                <a:latin typeface="Malgun Gothic" charset="-127"/>
+                <a:ea typeface="Malgun Gothic" charset="-127"/>
+                <a:cs typeface="Malgun Gothic" charset="-127"/>
+                <a:sym typeface="Wingdings"/>
+              </a:rPr>
+              <a:t>Correctly Classified Instances : </a:t>
+            </a:r>
+            <a:r>
+              <a:rPr lang="en-US" altLang="ko-KR" sz="1800" b="1" dirty="0" smtClean="0">
+                <a:latin typeface="Malgun Gothic" charset="-127"/>
+                <a:ea typeface="Malgun Gothic" charset="-127"/>
+                <a:cs typeface="Malgun Gothic" charset="-127"/>
+                <a:sym typeface="Wingdings"/>
+              </a:rPr>
+              <a:t>59%</a:t>
+            </a:r>
+          </a:p>
+          <a:p>
+            <a:pPr eaLnBrk="1" fontAlgn="auto" latinLnBrk="0" hangingPunct="1">
+              <a:lnSpc>
+                <a:spcPct val="150000"/>
+              </a:lnSpc>
+              <a:spcBef>
+                <a:spcPts val="0"/>
+              </a:spcBef>
+              <a:spcAft>
+                <a:spcPts val="0"/>
+              </a:spcAft>
+            </a:pPr>
+            <a:r>
+              <a:rPr lang="en-US" altLang="ko-KR" sz="1800" dirty="0" smtClean="0">
+                <a:latin typeface="Malgun Gothic" charset="-127"/>
+                <a:ea typeface="Malgun Gothic" charset="-127"/>
+                <a:cs typeface="Malgun Gothic" charset="-127"/>
+                <a:sym typeface="Wingdings"/>
+              </a:rPr>
+              <a:t>Options</a:t>
+            </a:r>
+          </a:p>
+          <a:p>
+            <a:pPr lvl="1" eaLnBrk="1" fontAlgn="auto" latinLnBrk="0" hangingPunct="1">
+              <a:lnSpc>
+                <a:spcPct val="150000"/>
+              </a:lnSpc>
+              <a:spcBef>
+                <a:spcPts val="0"/>
+              </a:spcBef>
+              <a:spcAft>
+                <a:spcPts val="0"/>
+              </a:spcAft>
+            </a:pPr>
+            <a:r>
+              <a:rPr lang="en-US" altLang="ko-KR" sz="1600" dirty="0" smtClean="0">
+                <a:latin typeface="Malgun Gothic" charset="-127"/>
+                <a:ea typeface="Malgun Gothic" charset="-127"/>
+                <a:cs typeface="Malgun Gothic" charset="-127"/>
+                <a:sym typeface="Wingdings"/>
+              </a:rPr>
+              <a:t>Max number of parents : 2</a:t>
+            </a:r>
+            <a:endParaRPr lang="en-US" altLang="ko-KR" sz="1600" dirty="0">
+              <a:latin typeface="Malgun Gothic" charset="-127"/>
+              <a:ea typeface="Malgun Gothic" charset="-127"/>
+              <a:cs typeface="Malgun Gothic" charset="-127"/>
+              <a:sym typeface="Wingdings"/>
+            </a:endParaRPr>
+          </a:p>
+        </p:txBody>
+      </p:sp>
+      <p:sp>
+        <p:nvSpPr>
+          <p:cNvPr id="9" name="내용 개체 틀 2"/>
+          <p:cNvSpPr txBox="1">
+            <a:spLocks/>
+          </p:cNvSpPr>
+          <p:nvPr/>
+        </p:nvSpPr>
+        <p:spPr bwMode="auto">
+          <a:xfrm>
+            <a:off x="457200" y="3750624"/>
+            <a:ext cx="4343400" cy="2438401"/>
+          </a:xfrm>
+          <a:prstGeom prst="rect">
+            <a:avLst/>
+          </a:prstGeom>
+          <a:noFill/>
+          <a:ln w="9525">
+            <a:noFill/>
+            <a:miter lim="800000"/>
+            <a:headEnd/>
+            <a:tailEnd/>
+          </a:ln>
+        </p:spPr>
+        <p:txBody>
+          <a:bodyPr vert="horz" wrap="square" lIns="91440" tIns="45720" rIns="91440" bIns="45720" numCol="1" anchor="t" anchorCtr="0" compatLnSpc="1">
+            <a:prstTxWarp prst="textNoShape">
+              <a:avLst/>
+            </a:prstTxWarp>
+          </a:bodyPr>
+          <a:lstStyle>
+            <a:lvl1pPr marL="176213" indent="-176213" algn="l" rtl="0" eaLnBrk="0" fontAlgn="base" latinLnBrk="1" hangingPunct="0">
+              <a:spcBef>
+                <a:spcPct val="20000"/>
+              </a:spcBef>
+              <a:spcAft>
+                <a:spcPct val="0"/>
+              </a:spcAft>
+              <a:buChar char="•"/>
+              <a:defRPr kumimoji="1" sz="2000" b="0">
+                <a:solidFill>
+                  <a:schemeClr val="tx1"/>
+                </a:solidFill>
+                <a:latin typeface="Arial" pitchFamily="34" charset="0"/>
+                <a:ea typeface="HY견고딕" pitchFamily="18" charset="-127"/>
+                <a:cs typeface="Arial" pitchFamily="34" charset="0"/>
+              </a:defRPr>
+            </a:lvl1pPr>
+            <a:lvl2pPr marL="539750" indent="-184150" algn="l" rtl="0" eaLnBrk="0" fontAlgn="base" latinLnBrk="1" hangingPunct="0">
+              <a:spcBef>
+                <a:spcPct val="20000"/>
+              </a:spcBef>
+              <a:spcAft>
+                <a:spcPct val="0"/>
+              </a:spcAft>
+              <a:buChar char="–"/>
+              <a:defRPr kumimoji="1" sz="1800" b="0">
+                <a:solidFill>
+                  <a:srgbClr val="000066"/>
+                </a:solidFill>
+                <a:latin typeface="Arial" pitchFamily="34" charset="0"/>
+                <a:ea typeface="HY견고딕" pitchFamily="18" charset="-127"/>
+                <a:cs typeface="Arial" pitchFamily="34" charset="0"/>
+              </a:defRPr>
+            </a:lvl2pPr>
+            <a:lvl3pPr marL="892175" indent="-173038" algn="l" rtl="0" eaLnBrk="0" fontAlgn="base" latinLnBrk="1" hangingPunct="0">
+              <a:spcBef>
+                <a:spcPct val="20000"/>
+              </a:spcBef>
+              <a:spcAft>
+                <a:spcPct val="0"/>
+              </a:spcAft>
+              <a:buChar char="•"/>
+              <a:defRPr kumimoji="1" sz="1400" b="0">
+                <a:solidFill>
+                  <a:schemeClr val="tx1">
+                    <a:lumMod val="65000"/>
+                    <a:lumOff val="35000"/>
+                  </a:schemeClr>
+                </a:solidFill>
+                <a:latin typeface="Arial" pitchFamily="34" charset="0"/>
+                <a:ea typeface="HY견고딕" pitchFamily="18" charset="-127"/>
+                <a:cs typeface="Arial" pitchFamily="34" charset="0"/>
+              </a:defRPr>
+            </a:lvl3pPr>
+            <a:lvl4pPr marL="1252538" indent="-176213" algn="l" rtl="0" eaLnBrk="0" fontAlgn="base" latinLnBrk="1" hangingPunct="0">
+              <a:spcBef>
+                <a:spcPct val="20000"/>
+              </a:spcBef>
+              <a:spcAft>
+                <a:spcPct val="0"/>
+              </a:spcAft>
+              <a:buChar char="–"/>
+              <a:defRPr kumimoji="1" sz="1400" b="0">
+                <a:solidFill>
+                  <a:srgbClr val="003300"/>
+                </a:solidFill>
+                <a:latin typeface="Arial" pitchFamily="34" charset="0"/>
+                <a:ea typeface="HY견고딕" pitchFamily="18" charset="-127"/>
+                <a:cs typeface="Arial" pitchFamily="34" charset="0"/>
+              </a:defRPr>
+            </a:lvl4pPr>
+            <a:lvl5pPr marL="1619250" indent="-187325" algn="l" rtl="0" eaLnBrk="0" fontAlgn="base" latinLnBrk="1" hangingPunct="0">
+              <a:spcBef>
+                <a:spcPct val="20000"/>
+              </a:spcBef>
+              <a:spcAft>
+                <a:spcPct val="0"/>
+              </a:spcAft>
+              <a:buChar char="»"/>
+              <a:defRPr kumimoji="1" sz="1400" b="0">
+                <a:solidFill>
+                  <a:srgbClr val="003366"/>
+                </a:solidFill>
+                <a:latin typeface="Arial" pitchFamily="34" charset="0"/>
+                <a:ea typeface="HY견고딕" pitchFamily="18" charset="-127"/>
+                <a:cs typeface="Arial" pitchFamily="34" charset="0"/>
+              </a:defRPr>
+            </a:lvl5pPr>
+            <a:lvl6pPr marL="2076450" indent="-187325" algn="l" rtl="0" fontAlgn="base" latinLnBrk="1">
+              <a:spcBef>
+                <a:spcPct val="20000"/>
+              </a:spcBef>
+              <a:spcAft>
+                <a:spcPct val="0"/>
+              </a:spcAft>
+              <a:buChar char="»"/>
+              <a:defRPr kumimoji="1" sz="1200">
+                <a:solidFill>
+                  <a:srgbClr val="003366"/>
+                </a:solidFill>
+                <a:latin typeface="+mn-lt"/>
+                <a:ea typeface="+mn-ea"/>
+              </a:defRPr>
+            </a:lvl6pPr>
+            <a:lvl7pPr marL="2533650" indent="-187325" algn="l" rtl="0" fontAlgn="base" latinLnBrk="1">
+              <a:spcBef>
+                <a:spcPct val="20000"/>
+              </a:spcBef>
+              <a:spcAft>
+                <a:spcPct val="0"/>
+              </a:spcAft>
+              <a:buChar char="»"/>
+              <a:defRPr kumimoji="1" sz="1200">
+                <a:solidFill>
+                  <a:srgbClr val="003366"/>
+                </a:solidFill>
+                <a:latin typeface="+mn-lt"/>
+                <a:ea typeface="+mn-ea"/>
+              </a:defRPr>
+            </a:lvl7pPr>
+            <a:lvl8pPr marL="2990850" indent="-187325" algn="l" rtl="0" fontAlgn="base" latinLnBrk="1">
+              <a:spcBef>
+                <a:spcPct val="20000"/>
+              </a:spcBef>
+              <a:spcAft>
+                <a:spcPct val="0"/>
+              </a:spcAft>
+              <a:buChar char="»"/>
+              <a:defRPr kumimoji="1" sz="1200">
+                <a:solidFill>
+                  <a:srgbClr val="003366"/>
+                </a:solidFill>
+                <a:latin typeface="+mn-lt"/>
+                <a:ea typeface="+mn-ea"/>
+              </a:defRPr>
+            </a:lvl8pPr>
+            <a:lvl9pPr marL="3448050" indent="-187325" algn="l" rtl="0" fontAlgn="base" latinLnBrk="1">
+              <a:spcBef>
+                <a:spcPct val="20000"/>
+              </a:spcBef>
+              <a:spcAft>
+                <a:spcPct val="0"/>
+              </a:spcAft>
+              <a:buChar char="»"/>
+              <a:defRPr kumimoji="1" sz="1200">
+                <a:solidFill>
+                  <a:srgbClr val="003366"/>
+                </a:solidFill>
+                <a:latin typeface="+mn-lt"/>
+                <a:ea typeface="+mn-ea"/>
+              </a:defRPr>
+            </a:lvl9pPr>
+          </a:lstStyle>
+          <a:p>
+            <a:pPr marL="0" indent="0" eaLnBrk="1" fontAlgn="auto" latinLnBrk="0" hangingPunct="1">
+              <a:spcBef>
+                <a:spcPts val="0"/>
+              </a:spcBef>
+              <a:spcAft>
+                <a:spcPts val="0"/>
+              </a:spcAft>
+              <a:buFontTx/>
+              <a:buNone/>
+            </a:pPr>
+            <a:r>
+              <a:rPr lang="en-US" altLang="ko-KR" b="1" kern="0" dirty="0" smtClean="0">
+                <a:latin typeface="Malgun Gothic" charset="-127"/>
+                <a:ea typeface="Malgun Gothic" charset="-127"/>
+                <a:cs typeface="Malgun Gothic" charset="-127"/>
+                <a:sym typeface="Wingdings"/>
+              </a:rPr>
+              <a:t>Simulated Annealing</a:t>
+            </a:r>
+          </a:p>
+          <a:p>
+            <a:pPr eaLnBrk="1" fontAlgn="auto" latinLnBrk="0" hangingPunct="1">
+              <a:lnSpc>
+                <a:spcPct val="200000"/>
+              </a:lnSpc>
+              <a:spcBef>
+                <a:spcPts val="0"/>
+              </a:spcBef>
+              <a:spcAft>
+                <a:spcPts val="0"/>
+              </a:spcAft>
+            </a:pPr>
+            <a:r>
+              <a:rPr lang="en-US" altLang="ko-KR" sz="1800" kern="0" dirty="0" smtClean="0">
+                <a:latin typeface="Malgun Gothic" charset="-127"/>
+                <a:ea typeface="Malgun Gothic" charset="-127"/>
+                <a:cs typeface="Malgun Gothic" charset="-127"/>
+                <a:sym typeface="Wingdings"/>
+              </a:rPr>
+              <a:t>Correctly Classified Instances : </a:t>
+            </a:r>
+            <a:r>
+              <a:rPr lang="en-US" altLang="ko-KR" sz="1800" b="1" kern="0" dirty="0" smtClean="0">
+                <a:latin typeface="Malgun Gothic" charset="-127"/>
+                <a:ea typeface="Malgun Gothic" charset="-127"/>
+                <a:cs typeface="Malgun Gothic" charset="-127"/>
+                <a:sym typeface="Wingdings"/>
+              </a:rPr>
+              <a:t>62.5%</a:t>
+            </a:r>
+          </a:p>
+          <a:p>
+            <a:pPr eaLnBrk="1" fontAlgn="auto" latinLnBrk="0" hangingPunct="1">
+              <a:lnSpc>
+                <a:spcPct val="150000"/>
+              </a:lnSpc>
+              <a:spcBef>
+                <a:spcPts val="0"/>
+              </a:spcBef>
+              <a:spcAft>
+                <a:spcPts val="0"/>
+              </a:spcAft>
+            </a:pPr>
+            <a:r>
+              <a:rPr lang="en-US" altLang="ko-KR" sz="1800" kern="0" dirty="0" smtClean="0">
+                <a:latin typeface="Malgun Gothic" charset="-127"/>
+                <a:ea typeface="Malgun Gothic" charset="-127"/>
+                <a:cs typeface="Malgun Gothic" charset="-127"/>
+                <a:sym typeface="Wingdings"/>
+              </a:rPr>
+              <a:t>Options</a:t>
+            </a:r>
+          </a:p>
+          <a:p>
+            <a:pPr lvl="1" eaLnBrk="1" fontAlgn="auto" latinLnBrk="0" hangingPunct="1">
+              <a:lnSpc>
+                <a:spcPct val="150000"/>
+              </a:lnSpc>
+              <a:spcBef>
+                <a:spcPts val="0"/>
+              </a:spcBef>
+              <a:spcAft>
+                <a:spcPts val="0"/>
+              </a:spcAft>
+            </a:pPr>
+            <a:r>
+              <a:rPr lang="en-US" altLang="ko-KR" sz="1600" kern="0" dirty="0" err="1" smtClean="0">
+                <a:latin typeface="Malgun Gothic" charset="-127"/>
+                <a:ea typeface="Malgun Gothic" charset="-127"/>
+                <a:cs typeface="Malgun Gothic" charset="-127"/>
+                <a:sym typeface="Wingdings"/>
+              </a:rPr>
+              <a:t>Tstart</a:t>
+            </a:r>
+            <a:r>
+              <a:rPr lang="en-US" altLang="ko-KR" sz="1600" kern="0" dirty="0" smtClean="0">
+                <a:latin typeface="Malgun Gothic" charset="-127"/>
+                <a:ea typeface="Malgun Gothic" charset="-127"/>
+                <a:cs typeface="Malgun Gothic" charset="-127"/>
+                <a:sym typeface="Wingdings"/>
+              </a:rPr>
+              <a:t> : 10.0</a:t>
+            </a:r>
+          </a:p>
+          <a:p>
+            <a:pPr lvl="1" eaLnBrk="1" fontAlgn="auto" latinLnBrk="0" hangingPunct="1">
+              <a:lnSpc>
+                <a:spcPct val="150000"/>
+              </a:lnSpc>
+              <a:spcBef>
+                <a:spcPts val="0"/>
+              </a:spcBef>
+              <a:spcAft>
+                <a:spcPts val="0"/>
+              </a:spcAft>
+            </a:pPr>
+            <a:r>
+              <a:rPr lang="en-US" altLang="ko-KR" sz="1600" kern="0" dirty="0" smtClean="0">
+                <a:latin typeface="Malgun Gothic" charset="-127"/>
+                <a:ea typeface="Malgun Gothic" charset="-127"/>
+                <a:cs typeface="Malgun Gothic" charset="-127"/>
+                <a:sym typeface="Wingdings"/>
+              </a:rPr>
+              <a:t>Delta : 0.999</a:t>
+            </a:r>
+            <a:endParaRPr lang="en-US" altLang="ko-KR" sz="1600" kern="0" dirty="0">
+              <a:latin typeface="Malgun Gothic" charset="-127"/>
+              <a:ea typeface="Malgun Gothic" charset="-127"/>
+              <a:cs typeface="Malgun Gothic" charset="-127"/>
+              <a:sym typeface="Wingdings"/>
+            </a:endParaRPr>
+          </a:p>
+        </p:txBody>
+      </p:sp>
+      <p:pic>
+        <p:nvPicPr>
+          <p:cNvPr id="7" name="그림 6"/>
+          <p:cNvPicPr>
+            <a:picLocks noChangeAspect="1"/>
+          </p:cNvPicPr>
+          <p:nvPr/>
+        </p:nvPicPr>
+        <p:blipFill>
+          <a:blip r:embed="rId3">
+            <a:extLst>
+              <a:ext uri="{28A0092B-C50C-407E-A947-70E740481C1C}">
+                <a14:useLocalDpi xmlns:a14="http://schemas.microsoft.com/office/drawing/2010/main" val="0"/>
+              </a:ext>
+            </a:extLst>
+          </a:blip>
+          <a:stretch>
+            <a:fillRect/>
+          </a:stretch>
+        </p:blipFill>
+        <p:spPr>
+          <a:xfrm>
+            <a:off x="4800600" y="1143000"/>
+            <a:ext cx="3405655" cy="2374877"/>
+          </a:xfrm>
+          <a:prstGeom prst="rect">
+            <a:avLst/>
+          </a:prstGeom>
+        </p:spPr>
+      </p:pic>
+      <p:pic>
+        <p:nvPicPr>
+          <p:cNvPr id="10" name="그림 9"/>
+          <p:cNvPicPr>
+            <a:picLocks noChangeAspect="1"/>
+          </p:cNvPicPr>
+          <p:nvPr/>
+        </p:nvPicPr>
+        <p:blipFill>
+          <a:blip r:embed="rId4">
+            <a:extLst>
+              <a:ext uri="{28A0092B-C50C-407E-A947-70E740481C1C}">
+                <a14:useLocalDpi xmlns:a14="http://schemas.microsoft.com/office/drawing/2010/main" val="0"/>
+              </a:ext>
+            </a:extLst>
+          </a:blip>
+          <a:stretch>
+            <a:fillRect/>
+          </a:stretch>
+        </p:blipFill>
+        <p:spPr>
+          <a:xfrm>
+            <a:off x="4800600" y="3867543"/>
+            <a:ext cx="3305175" cy="2533257"/>
+          </a:xfrm>
+          <a:prstGeom prst="rect">
+            <a:avLst/>
+          </a:prstGeom>
+        </p:spPr>
+      </p:pic>
+    </p:spTree>
+    <p:extLst>
+      <p:ext uri="{BB962C8B-B14F-4D97-AF65-F5344CB8AC3E}">
+        <p14:creationId xmlns:p14="http://schemas.microsoft.com/office/powerpoint/2010/main" val="143893194"/>
+      </p:ext>
+    </p:extLst>
+  </p:cSld>
+  <p:clrMapOvr>
+    <a:masterClrMapping/>
+  </p:clrMapOvr>
+  <p:timing>
+    <p:tnLst>
+      <p:par>
+        <p:cTn id="1" dur="indefinite" restart="never" nodeType="tmRoot"/>
+      </p:par>
+    </p:tnLst>
+  </p:timing>
+</p:sld>
+</file>
+
+<file path=ppt/slides/slide5.xml><?xml version="1.0" encoding="utf-8"?>
+<p:sld xmlns:a="http://schemas.openxmlformats.org/drawingml/2006/main" xmlns:r="http://schemas.openxmlformats.org/officeDocument/2006/relationships" xmlns:p="http://schemas.openxmlformats.org/presentationml/2006/main">
+  <p:cSld>
+    <p:spTree>
+      <p:nvGrpSpPr>
+        <p:cNvPr id="1" name=""/>
+        <p:cNvGrpSpPr/>
+        <p:nvPr/>
+      </p:nvGrpSpPr>
+      <p:grpSpPr>
+        <a:xfrm>
+          <a:off x="0" y="0"/>
+          <a:ext cx="0" cy="0"/>
+          <a:chOff x="0" y="0"/>
+          <a:chExt cx="0" cy="0"/>
+        </a:xfrm>
+      </p:grpSpPr>
+      <p:sp>
+        <p:nvSpPr>
+          <p:cNvPr id="2" name="제목 1"/>
+          <p:cNvSpPr>
+            <a:spLocks noGrp="1"/>
+          </p:cNvSpPr>
+          <p:nvPr>
+            <p:ph type="title"/>
+          </p:nvPr>
+        </p:nvSpPr>
+        <p:spPr/>
+        <p:txBody>
+          <a:bodyPr/>
+          <a:lstStyle/>
+          <a:p>
+            <a:r>
+              <a:rPr lang="ko-KR" altLang="en-US" b="1" dirty="0" smtClean="0">
+                <a:latin typeface="맑은 고딕" pitchFamily="50" charset="-127"/>
+                <a:ea typeface="맑은 고딕" pitchFamily="50" charset="-127"/>
+              </a:rPr>
+              <a:t>실험 결과</a:t>
+            </a:r>
+            <a:endParaRPr lang="ko-KR" altLang="en-US" b="1" dirty="0">
+              <a:latin typeface="맑은 고딕" pitchFamily="50" charset="-127"/>
+              <a:ea typeface="맑은 고딕" pitchFamily="50" charset="-127"/>
+            </a:endParaRPr>
+          </a:p>
+        </p:txBody>
+      </p:sp>
+      <p:sp>
+        <p:nvSpPr>
+          <p:cNvPr id="4" name="슬라이드 번호 개체 틀 3"/>
+          <p:cNvSpPr>
+            <a:spLocks noGrp="1"/>
+          </p:cNvSpPr>
+          <p:nvPr>
+            <p:ph type="sldNum" sz="quarter" idx="10"/>
+          </p:nvPr>
+        </p:nvSpPr>
+        <p:spPr/>
+        <p:txBody>
+          <a:bodyPr/>
+          <a:lstStyle/>
+          <a:p>
+            <a:pPr>
+              <a:defRPr/>
+            </a:pPr>
+            <a:fld id="{D2F43F9C-7459-44BF-9323-EE784D731C4C}" type="slidenum">
+              <a:rPr lang="ko-KR" altLang="en-US" smtClean="0"/>
+              <a:pPr>
+                <a:defRPr/>
+              </a:pPr>
+              <a:t>4</a:t>
+            </a:fld>
+            <a:endParaRPr lang="en-US" altLang="ko-KR" dirty="0"/>
+          </a:p>
+        </p:txBody>
+      </p:sp>
+      <p:sp>
+        <p:nvSpPr>
+          <p:cNvPr id="5" name="텍스트 개체 틀 4"/>
+          <p:cNvSpPr>
+            <a:spLocks noGrp="1"/>
+          </p:cNvSpPr>
+          <p:nvPr>
+            <p:ph type="body" sz="quarter" idx="11"/>
+          </p:nvPr>
+        </p:nvSpPr>
+        <p:spPr/>
+        <p:txBody>
+          <a:bodyPr/>
+          <a:lstStyle/>
+          <a:p>
+            <a:endParaRPr lang="ko-KR" altLang="en-US" dirty="0"/>
+          </a:p>
+        </p:txBody>
+      </p:sp>
+      <p:cxnSp>
+        <p:nvCxnSpPr>
+          <p:cNvPr id="26" name="직선 화살표 연결선 25"/>
+          <p:cNvCxnSpPr/>
+          <p:nvPr/>
+        </p:nvCxnSpPr>
+        <p:spPr bwMode="auto">
+          <a:xfrm>
+            <a:off x="8534400" y="5791200"/>
+            <a:ext cx="152400" cy="0"/>
+          </a:xfrm>
+          <a:prstGeom prst="straightConnector1">
+            <a:avLst/>
+          </a:prstGeom>
+          <a:solidFill>
+            <a:schemeClr val="folHlink"/>
+          </a:solidFill>
+          <a:ln w="19050" cap="flat" cmpd="sng" algn="ctr">
+            <a:solidFill>
+              <a:schemeClr val="tx1"/>
+            </a:solidFill>
+            <a:prstDash val="solid"/>
+            <a:round/>
+            <a:headEnd type="none" w="med" len="med"/>
+            <a:tailEnd type="arrow"/>
+          </a:ln>
+          <a:effectLst/>
+        </p:spPr>
+      </p:cxnSp>
+      <p:sp>
+        <p:nvSpPr>
+          <p:cNvPr id="3" name="내용 개체 틀 2"/>
+          <p:cNvSpPr>
+            <a:spLocks noGrp="1"/>
+          </p:cNvSpPr>
+          <p:nvPr>
+            <p:ph idx="1"/>
+          </p:nvPr>
+        </p:nvSpPr>
+        <p:spPr/>
+        <p:txBody>
+          <a:bodyPr/>
+          <a:lstStyle/>
+          <a:p>
+            <a:pPr>
+              <a:lnSpc>
+                <a:spcPct val="150000"/>
+              </a:lnSpc>
+            </a:pPr>
+            <a:r>
+              <a:rPr lang="en-US" altLang="ko-KR" dirty="0" smtClean="0">
+                <a:latin typeface="Malgun Gothic" charset="-127"/>
+                <a:ea typeface="Malgun Gothic" charset="-127"/>
+                <a:cs typeface="Malgun Gothic" charset="-127"/>
+              </a:rPr>
+              <a:t>Correctly Classified Instances</a:t>
+            </a:r>
+            <a:r>
+              <a:rPr lang="ko-KR" altLang="en-US" dirty="0" smtClean="0">
+                <a:latin typeface="Malgun Gothic" charset="-127"/>
+                <a:ea typeface="Malgun Gothic" charset="-127"/>
+                <a:cs typeface="Malgun Gothic" charset="-127"/>
+              </a:rPr>
+              <a:t>는 </a:t>
+            </a:r>
+            <a:r>
+              <a:rPr lang="en-US" altLang="ko-KR" dirty="0" smtClean="0">
+                <a:latin typeface="Malgun Gothic" charset="-127"/>
+                <a:ea typeface="Malgun Gothic" charset="-127"/>
+                <a:cs typeface="Malgun Gothic" charset="-127"/>
+              </a:rPr>
+              <a:t>Simulated Annealing</a:t>
+            </a:r>
+            <a:r>
+              <a:rPr lang="ko-KR" altLang="en-US" dirty="0" smtClean="0">
+                <a:latin typeface="Malgun Gothic" charset="-127"/>
+                <a:ea typeface="Malgun Gothic" charset="-127"/>
+                <a:cs typeface="Malgun Gothic" charset="-127"/>
+              </a:rPr>
+              <a:t>이 가장 좋은 결과를 보여줌</a:t>
+            </a:r>
+            <a:r>
+              <a:rPr lang="en-US" altLang="ko-KR" dirty="0" smtClean="0">
+                <a:latin typeface="Malgun Gothic" charset="-127"/>
+                <a:ea typeface="Malgun Gothic" charset="-127"/>
+                <a:cs typeface="Malgun Gothic" charset="-127"/>
+              </a:rPr>
+              <a:t>.</a:t>
+            </a:r>
+          </a:p>
+          <a:p>
+            <a:pPr>
+              <a:lnSpc>
+                <a:spcPct val="150000"/>
+              </a:lnSpc>
+            </a:pPr>
+            <a:r>
+              <a:rPr lang="ko-KR" altLang="en-US" dirty="0" smtClean="0">
+                <a:latin typeface="Malgun Gothic" charset="-127"/>
+                <a:ea typeface="Malgun Gothic" charset="-127"/>
+                <a:cs typeface="Malgun Gothic" charset="-127"/>
+              </a:rPr>
+              <a:t>하지만 </a:t>
+            </a:r>
+            <a:r>
+              <a:rPr lang="en-US" altLang="ko-KR" dirty="0" smtClean="0">
+                <a:latin typeface="Malgun Gothic" charset="-127"/>
+                <a:ea typeface="Malgun Gothic" charset="-127"/>
+                <a:cs typeface="Malgun Gothic" charset="-127"/>
+              </a:rPr>
+              <a:t>Graph</a:t>
+            </a:r>
+            <a:r>
+              <a:rPr lang="ko-KR" altLang="en-US" dirty="0" smtClean="0">
+                <a:latin typeface="Malgun Gothic" charset="-127"/>
+                <a:ea typeface="Malgun Gothic" charset="-127"/>
+                <a:cs typeface="Malgun Gothic" charset="-127"/>
+              </a:rPr>
+              <a:t> </a:t>
+            </a:r>
+            <a:r>
+              <a:rPr lang="en-US" altLang="ko-KR" dirty="0" smtClean="0">
+                <a:latin typeface="Malgun Gothic" charset="-127"/>
+                <a:ea typeface="Malgun Gothic" charset="-127"/>
+                <a:cs typeface="Malgun Gothic" charset="-127"/>
+              </a:rPr>
+              <a:t>Structure</a:t>
+            </a:r>
+            <a:r>
+              <a:rPr lang="ko-KR" altLang="en-US" dirty="0" smtClean="0">
+                <a:latin typeface="Malgun Gothic" charset="-127"/>
+                <a:ea typeface="Malgun Gothic" charset="-127"/>
+                <a:cs typeface="Malgun Gothic" charset="-127"/>
+              </a:rPr>
+              <a:t>가 알려진 것과는 상이</a:t>
+            </a:r>
+            <a:r>
+              <a:rPr lang="en-US" altLang="ko-KR" dirty="0" smtClean="0">
+                <a:latin typeface="Malgun Gothic" charset="-127"/>
+                <a:ea typeface="Malgun Gothic" charset="-127"/>
+                <a:cs typeface="Malgun Gothic" charset="-127"/>
+              </a:rPr>
+              <a:t>.</a:t>
+            </a:r>
+          </a:p>
+          <a:p>
+            <a:pPr>
+              <a:lnSpc>
+                <a:spcPct val="150000"/>
+              </a:lnSpc>
+            </a:pPr>
+            <a:r>
+              <a:rPr lang="en-US" altLang="ko-KR" dirty="0" smtClean="0">
+                <a:latin typeface="Malgun Gothic" charset="-127"/>
+                <a:ea typeface="Malgun Gothic" charset="-127"/>
+                <a:cs typeface="Malgun Gothic" charset="-127"/>
+              </a:rPr>
+              <a:t>K2</a:t>
+            </a:r>
+            <a:r>
+              <a:rPr lang="ko-KR" altLang="en-US" dirty="0" smtClean="0">
+                <a:latin typeface="Malgun Gothic" charset="-127"/>
+                <a:ea typeface="Malgun Gothic" charset="-127"/>
+                <a:cs typeface="Malgun Gothic" charset="-127"/>
+              </a:rPr>
+              <a:t> 알고리즘은 결과값은 약간 작았으나 다른 알고리즘에 비해 그래프 일치도가 매우 높음</a:t>
+            </a:r>
+            <a:r>
+              <a:rPr lang="en-US" altLang="ko-KR" dirty="0" smtClean="0">
+                <a:latin typeface="Malgun Gothic" charset="-127"/>
+                <a:ea typeface="Malgun Gothic" charset="-127"/>
+                <a:cs typeface="Malgun Gothic" charset="-127"/>
+              </a:rPr>
+              <a:t>.</a:t>
+            </a:r>
+          </a:p>
+          <a:p>
+            <a:pPr>
+              <a:lnSpc>
+                <a:spcPct val="150000"/>
+              </a:lnSpc>
+            </a:pPr>
+            <a:endParaRPr lang="en-US" altLang="ko-KR" dirty="0">
+              <a:latin typeface="Malgun Gothic" charset="-127"/>
+              <a:ea typeface="Malgun Gothic" charset="-127"/>
+              <a:cs typeface="Malgun Gothic" charset="-127"/>
+            </a:endParaRPr>
+          </a:p>
+          <a:p>
+            <a:pPr>
+              <a:lnSpc>
+                <a:spcPct val="150000"/>
+              </a:lnSpc>
+            </a:pPr>
+            <a:r>
+              <a:rPr lang="ko-KR" altLang="en-US" dirty="0" smtClean="0">
+                <a:latin typeface="Malgun Gothic" charset="-127"/>
+                <a:ea typeface="Malgun Gothic" charset="-127"/>
+                <a:cs typeface="Malgun Gothic" charset="-127"/>
+              </a:rPr>
+              <a:t>따라서 데이터 수가 </a:t>
+            </a:r>
+            <a:r>
+              <a:rPr lang="en-US" altLang="ko-KR" dirty="0" smtClean="0">
+                <a:latin typeface="Malgun Gothic" charset="-127"/>
+                <a:ea typeface="Malgun Gothic" charset="-127"/>
+                <a:cs typeface="Malgun Gothic" charset="-127"/>
+              </a:rPr>
+              <a:t>1000</a:t>
+            </a:r>
+            <a:r>
+              <a:rPr lang="ko-KR" altLang="en-US" dirty="0" smtClean="0">
+                <a:latin typeface="Malgun Gothic" charset="-127"/>
+                <a:ea typeface="Malgun Gothic" charset="-127"/>
+                <a:cs typeface="Malgun Gothic" charset="-127"/>
+              </a:rPr>
+              <a:t>개 내외로 가정할 때</a:t>
+            </a:r>
+            <a:r>
+              <a:rPr lang="en-US" altLang="ko-KR" dirty="0" smtClean="0">
+                <a:latin typeface="Malgun Gothic" charset="-127"/>
+                <a:ea typeface="Malgun Gothic" charset="-127"/>
+                <a:cs typeface="Malgun Gothic" charset="-127"/>
+              </a:rPr>
+              <a:t>,</a:t>
+            </a:r>
+            <a:r>
+              <a:rPr lang="ko-KR" altLang="en-US" dirty="0" smtClean="0">
+                <a:latin typeface="Malgun Gothic" charset="-127"/>
+                <a:ea typeface="Malgun Gothic" charset="-127"/>
+                <a:cs typeface="Malgun Gothic" charset="-127"/>
+              </a:rPr>
+              <a:t> </a:t>
+            </a:r>
+            <a:r>
+              <a:rPr lang="en-US" altLang="ko-KR" dirty="0" smtClean="0">
+                <a:latin typeface="Malgun Gothic" charset="-127"/>
+                <a:ea typeface="Malgun Gothic" charset="-127"/>
+                <a:cs typeface="Malgun Gothic" charset="-127"/>
+              </a:rPr>
+              <a:t>K2</a:t>
+            </a:r>
+            <a:r>
+              <a:rPr lang="ko-KR" altLang="en-US" dirty="0" smtClean="0">
+                <a:latin typeface="Malgun Gothic" charset="-127"/>
+                <a:ea typeface="Malgun Gothic" charset="-127"/>
+                <a:cs typeface="Malgun Gothic" charset="-127"/>
+              </a:rPr>
+              <a:t>가 가장 적합할 것이라고 기대됨</a:t>
+            </a:r>
+            <a:r>
+              <a:rPr lang="en-US" altLang="ko-KR" dirty="0" smtClean="0">
+                <a:latin typeface="Malgun Gothic" charset="-127"/>
+                <a:ea typeface="Malgun Gothic" charset="-127"/>
+                <a:cs typeface="Malgun Gothic" charset="-127"/>
+              </a:rPr>
+              <a:t>.</a:t>
+            </a:r>
+          </a:p>
+        </p:txBody>
+      </p:sp>
+    </p:spTree>
+    <p:extLst>
+      <p:ext uri="{BB962C8B-B14F-4D97-AF65-F5344CB8AC3E}">
+        <p14:creationId xmlns:p14="http://schemas.microsoft.com/office/powerpoint/2010/main" val="1325922903"/>
+      </p:ext>
+    </p:extLst>
+  </p:cSld>
+  <p:clrMapOvr>
+    <a:masterClrMapping/>
+  </p:clrMapOvr>
+  <p:timing>
+    <p:tnLst>
+      <p:par>
+        <p:cTn id="1" dur="indefinite" restart="never" nodeType="tmRoot"/>
+      </p:par>
+    </p:tnLst>
+  </p:timing>
+</p:sld>
+</file>
+
+<file path=ppt/slides/slide6.xml><?xml version="1.0" encoding="utf-8"?>
 <p:sld xmlns:a="http://schemas.openxmlformats.org/drawingml/2006/main" xmlns:r="http://schemas.openxmlformats.org/officeDocument/2006/relationships" xmlns:p="http://schemas.openxmlformats.org/presentationml/2006/main">
   <p:cSld>
     <p:spTree>
@@ -7106,7 +8642,7 @@
               <a:pPr>
                 <a:defRPr/>
               </a:pPr>
-              <a:t>3</a:t>
+              <a:t>5</a:t>
             </a:fld>
             <a:endParaRPr lang="en-US" altLang="ko-KR" dirty="0"/>
           </a:p>
@@ -7180,7 +8716,7 @@
 </p:sld>
 </file>
 
-<file path=ppt/slides/slide5.xml><?xml version="1.0" encoding="utf-8"?>
+<file path=ppt/slides/slide7.xml><?xml version="1.0" encoding="utf-8"?>
 <p:sld xmlns:a="http://schemas.openxmlformats.org/drawingml/2006/main" xmlns:r="http://schemas.openxmlformats.org/officeDocument/2006/relationships" xmlns:p="http://schemas.openxmlformats.org/presentationml/2006/main">
   <p:cSld>
     <p:spTree>
@@ -7243,7 +8779,7 @@
               <a:pPr>
                 <a:defRPr/>
               </a:pPr>
-              <a:t>4</a:t>
+              <a:t>6</a:t>
             </a:fld>
             <a:endParaRPr lang="en-US" altLang="ko-KR" dirty="0"/>
           </a:p>

</xml_diff>